<commit_message>
Artigo 100% + Slides
</commit_message>
<xml_diff>
--- a/docs/BreadTrack - Roterio Apresentação.pptx
+++ b/docs/BreadTrack - Roterio Apresentação.pptx
@@ -8,16 +8,18 @@
     <p:sldId id="256" r:id="rId2"/>
     <p:sldId id="257" r:id="rId3"/>
     <p:sldId id="260" r:id="rId4"/>
-    <p:sldId id="263" r:id="rId5"/>
-    <p:sldId id="264" r:id="rId6"/>
-    <p:sldId id="265" r:id="rId7"/>
-    <p:sldId id="266" r:id="rId8"/>
-    <p:sldId id="267" r:id="rId9"/>
-    <p:sldId id="268" r:id="rId10"/>
-    <p:sldId id="269" r:id="rId11"/>
-    <p:sldId id="270" r:id="rId12"/>
-    <p:sldId id="271" r:id="rId13"/>
-    <p:sldId id="272" r:id="rId14"/>
+    <p:sldId id="273" r:id="rId5"/>
+    <p:sldId id="263" r:id="rId6"/>
+    <p:sldId id="264" r:id="rId7"/>
+    <p:sldId id="265" r:id="rId8"/>
+    <p:sldId id="266" r:id="rId9"/>
+    <p:sldId id="267" r:id="rId10"/>
+    <p:sldId id="268" r:id="rId11"/>
+    <p:sldId id="269" r:id="rId12"/>
+    <p:sldId id="270" r:id="rId13"/>
+    <p:sldId id="271" r:id="rId14"/>
+    <p:sldId id="274" r:id="rId15"/>
+    <p:sldId id="272" r:id="rId16"/>
   </p:sldIdLst>
   <p:sldSz cx="12192000" cy="6858000"/>
   <p:notesSz cx="12192000" cy="6858000"/>
@@ -2187,6 +2189,838 @@
         </p:nvSpPr>
         <p:spPr>
           <a:xfrm>
+            <a:off x="4503801" y="572846"/>
+            <a:ext cx="3023235" cy="574675"/>
+          </a:xfrm>
+          <a:prstGeom prst="rect">
+            <a:avLst/>
+          </a:prstGeom>
+        </p:spPr>
+        <p:txBody>
+          <a:bodyPr vert="horz" wrap="square" lIns="0" tIns="12700" rIns="0" bIns="0" rtlCol="0">
+            <a:spAutoFit/>
+          </a:bodyPr>
+          <a:lstStyle/>
+          <a:p>
+            <a:pPr marL="12700">
+              <a:lnSpc>
+                <a:spcPct val="100000"/>
+              </a:lnSpc>
+              <a:spcBef>
+                <a:spcPts val="100"/>
+              </a:spcBef>
+            </a:pPr>
+            <a:r>
+              <a:rPr dirty="0"/>
+              <a:t>RELAT</a:t>
+            </a:r>
+            <a:r>
+              <a:rPr spc="-15" dirty="0"/>
+              <a:t>Ó</a:t>
+            </a:r>
+            <a:r>
+              <a:rPr dirty="0"/>
+              <a:t>RIOS</a:t>
+            </a:r>
+          </a:p>
+        </p:txBody>
+      </p:sp>
+      <p:pic>
+        <p:nvPicPr>
+          <p:cNvPr id="3" name="object 3"/>
+          <p:cNvPicPr/>
+          <p:nvPr/>
+        </p:nvPicPr>
+        <p:blipFill>
+          <a:blip r:embed="rId2" cstate="print"/>
+          <a:stretch>
+            <a:fillRect/>
+          </a:stretch>
+        </p:blipFill>
+        <p:spPr>
+          <a:xfrm>
+            <a:off x="11454383" y="44196"/>
+            <a:ext cx="646176" cy="646176"/>
+          </a:xfrm>
+          <a:prstGeom prst="rect">
+            <a:avLst/>
+          </a:prstGeom>
+        </p:spPr>
+      </p:pic>
+      <p:grpSp>
+        <p:nvGrpSpPr>
+          <p:cNvPr id="4" name="object 4"/>
+          <p:cNvGrpSpPr/>
+          <p:nvPr/>
+        </p:nvGrpSpPr>
+        <p:grpSpPr>
+          <a:xfrm>
+            <a:off x="1776476" y="1425955"/>
+            <a:ext cx="3090545" cy="2357120"/>
+            <a:chOff x="1776476" y="1425955"/>
+            <a:chExt cx="3090545" cy="2357120"/>
+          </a:xfrm>
+        </p:grpSpPr>
+        <p:pic>
+          <p:nvPicPr>
+            <p:cNvPr id="5" name="object 5"/>
+            <p:cNvPicPr/>
+            <p:nvPr/>
+          </p:nvPicPr>
+          <p:blipFill>
+            <a:blip r:embed="rId3" cstate="print"/>
+            <a:stretch>
+              <a:fillRect/>
+            </a:stretch>
+          </p:blipFill>
+          <p:spPr>
+            <a:xfrm>
+              <a:off x="1789176" y="1438655"/>
+              <a:ext cx="3064764" cy="2331720"/>
+            </a:xfrm>
+            <a:prstGeom prst="rect">
+              <a:avLst/>
+            </a:prstGeom>
+          </p:spPr>
+        </p:pic>
+        <p:sp>
+          <p:nvSpPr>
+            <p:cNvPr id="6" name="object 6"/>
+            <p:cNvSpPr/>
+            <p:nvPr/>
+          </p:nvSpPr>
+          <p:spPr>
+            <a:xfrm>
+              <a:off x="1782826" y="1432305"/>
+              <a:ext cx="3077845" cy="2344420"/>
+            </a:xfrm>
+            <a:custGeom>
+              <a:avLst/>
+              <a:gdLst/>
+              <a:ahLst/>
+              <a:cxnLst/>
+              <a:rect l="l" t="t" r="r" b="b"/>
+              <a:pathLst>
+                <a:path w="3077845" h="2344420">
+                  <a:moveTo>
+                    <a:pt x="0" y="2344420"/>
+                  </a:moveTo>
+                  <a:lnTo>
+                    <a:pt x="3077464" y="2344420"/>
+                  </a:lnTo>
+                  <a:lnTo>
+                    <a:pt x="3077464" y="0"/>
+                  </a:lnTo>
+                  <a:lnTo>
+                    <a:pt x="0" y="0"/>
+                  </a:lnTo>
+                  <a:lnTo>
+                    <a:pt x="0" y="2344420"/>
+                  </a:lnTo>
+                  <a:close/>
+                </a:path>
+              </a:pathLst>
+            </a:custGeom>
+            <a:ln w="12699">
+              <a:solidFill>
+                <a:srgbClr val="FFFFFF"/>
+              </a:solidFill>
+            </a:ln>
+          </p:spPr>
+          <p:txBody>
+            <a:bodyPr wrap="square" lIns="0" tIns="0" rIns="0" bIns="0" rtlCol="0"/>
+            <a:lstStyle/>
+            <a:p>
+              <a:endParaRPr/>
+            </a:p>
+          </p:txBody>
+        </p:sp>
+      </p:grpSp>
+      <p:grpSp>
+        <p:nvGrpSpPr>
+          <p:cNvPr id="7" name="object 7"/>
+          <p:cNvGrpSpPr/>
+          <p:nvPr/>
+        </p:nvGrpSpPr>
+        <p:grpSpPr>
+          <a:xfrm>
+            <a:off x="1235455" y="3996944"/>
+            <a:ext cx="4173854" cy="2263140"/>
+            <a:chOff x="1235455" y="3996944"/>
+            <a:chExt cx="4173854" cy="2263140"/>
+          </a:xfrm>
+        </p:grpSpPr>
+        <p:pic>
+          <p:nvPicPr>
+            <p:cNvPr id="8" name="object 8"/>
+            <p:cNvPicPr/>
+            <p:nvPr/>
+          </p:nvPicPr>
+          <p:blipFill>
+            <a:blip r:embed="rId4" cstate="print"/>
+            <a:stretch>
+              <a:fillRect/>
+            </a:stretch>
+          </p:blipFill>
+          <p:spPr>
+            <a:xfrm>
+              <a:off x="1248155" y="4009644"/>
+              <a:ext cx="4148328" cy="2237232"/>
+            </a:xfrm>
+            <a:prstGeom prst="rect">
+              <a:avLst/>
+            </a:prstGeom>
+          </p:spPr>
+        </p:pic>
+        <p:sp>
+          <p:nvSpPr>
+            <p:cNvPr id="9" name="object 9"/>
+            <p:cNvSpPr/>
+            <p:nvPr/>
+          </p:nvSpPr>
+          <p:spPr>
+            <a:xfrm>
+              <a:off x="1241805" y="4003294"/>
+              <a:ext cx="4161154" cy="2250440"/>
+            </a:xfrm>
+            <a:custGeom>
+              <a:avLst/>
+              <a:gdLst/>
+              <a:ahLst/>
+              <a:cxnLst/>
+              <a:rect l="l" t="t" r="r" b="b"/>
+              <a:pathLst>
+                <a:path w="4161154" h="2250440">
+                  <a:moveTo>
+                    <a:pt x="0" y="2249931"/>
+                  </a:moveTo>
+                  <a:lnTo>
+                    <a:pt x="4161028" y="2249931"/>
+                  </a:lnTo>
+                  <a:lnTo>
+                    <a:pt x="4161028" y="0"/>
+                  </a:lnTo>
+                  <a:lnTo>
+                    <a:pt x="0" y="0"/>
+                  </a:lnTo>
+                  <a:lnTo>
+                    <a:pt x="0" y="2249931"/>
+                  </a:lnTo>
+                  <a:close/>
+                </a:path>
+              </a:pathLst>
+            </a:custGeom>
+            <a:ln w="12700">
+              <a:solidFill>
+                <a:srgbClr val="FFFFFF"/>
+              </a:solidFill>
+            </a:ln>
+          </p:spPr>
+          <p:txBody>
+            <a:bodyPr wrap="square" lIns="0" tIns="0" rIns="0" bIns="0" rtlCol="0"/>
+            <a:lstStyle/>
+            <a:p>
+              <a:endParaRPr/>
+            </a:p>
+          </p:txBody>
+        </p:sp>
+      </p:grpSp>
+      <p:sp>
+        <p:nvSpPr>
+          <p:cNvPr id="10" name="object 10"/>
+          <p:cNvSpPr txBox="1"/>
+          <p:nvPr/>
+        </p:nvSpPr>
+        <p:spPr>
+          <a:xfrm>
+            <a:off x="6299072" y="1669491"/>
+            <a:ext cx="4396105" cy="574675"/>
+          </a:xfrm>
+          <a:prstGeom prst="rect">
+            <a:avLst/>
+          </a:prstGeom>
+        </p:spPr>
+        <p:txBody>
+          <a:bodyPr vert="horz" wrap="square" lIns="0" tIns="12700" rIns="0" bIns="0" rtlCol="0">
+            <a:spAutoFit/>
+          </a:bodyPr>
+          <a:lstStyle/>
+          <a:p>
+            <a:pPr marL="12700">
+              <a:lnSpc>
+                <a:spcPct val="100000"/>
+              </a:lnSpc>
+              <a:spcBef>
+                <a:spcPts val="100"/>
+              </a:spcBef>
+            </a:pPr>
+            <a:r>
+              <a:rPr sz="1800" spc="-5" dirty="0">
+                <a:solidFill>
+                  <a:srgbClr val="669668"/>
+                </a:solidFill>
+                <a:latin typeface="Courier New"/>
+                <a:cs typeface="Courier New"/>
+              </a:rPr>
+              <a:t>--3)</a:t>
+            </a:r>
+            <a:r>
+              <a:rPr sz="1800" spc="-25" dirty="0">
+                <a:solidFill>
+                  <a:srgbClr val="669668"/>
+                </a:solidFill>
+                <a:latin typeface="Courier New"/>
+                <a:cs typeface="Courier New"/>
+              </a:rPr>
+              <a:t> </a:t>
+            </a:r>
+            <a:r>
+              <a:rPr sz="1800" spc="-10" dirty="0">
+                <a:solidFill>
+                  <a:srgbClr val="669668"/>
+                </a:solidFill>
+                <a:latin typeface="Courier New"/>
+                <a:cs typeface="Courier New"/>
+              </a:rPr>
+              <a:t>Relação dos</a:t>
+            </a:r>
+            <a:r>
+              <a:rPr sz="1800" spc="-25" dirty="0">
+                <a:solidFill>
+                  <a:srgbClr val="669668"/>
+                </a:solidFill>
+                <a:latin typeface="Courier New"/>
+                <a:cs typeface="Courier New"/>
+              </a:rPr>
+              <a:t> </a:t>
+            </a:r>
+            <a:r>
+              <a:rPr sz="1800" spc="-10" dirty="0">
+                <a:solidFill>
+                  <a:srgbClr val="669668"/>
+                </a:solidFill>
+                <a:latin typeface="Courier New"/>
+                <a:cs typeface="Courier New"/>
+              </a:rPr>
+              <a:t>top</a:t>
+            </a:r>
+            <a:r>
+              <a:rPr sz="1800" spc="-25" dirty="0">
+                <a:solidFill>
+                  <a:srgbClr val="669668"/>
+                </a:solidFill>
+                <a:latin typeface="Courier New"/>
+                <a:cs typeface="Courier New"/>
+              </a:rPr>
+              <a:t> </a:t>
+            </a:r>
+            <a:r>
+              <a:rPr sz="1800" spc="-10" dirty="0">
+                <a:solidFill>
+                  <a:srgbClr val="669668"/>
+                </a:solidFill>
+                <a:latin typeface="Courier New"/>
+                <a:cs typeface="Courier New"/>
+              </a:rPr>
+              <a:t>10</a:t>
+            </a:r>
+            <a:r>
+              <a:rPr sz="1800" spc="-5" dirty="0">
+                <a:solidFill>
+                  <a:srgbClr val="669668"/>
+                </a:solidFill>
+                <a:latin typeface="Courier New"/>
+                <a:cs typeface="Courier New"/>
+              </a:rPr>
+              <a:t> </a:t>
+            </a:r>
+            <a:r>
+              <a:rPr sz="1800" spc="-10" dirty="0">
+                <a:solidFill>
+                  <a:srgbClr val="669668"/>
+                </a:solidFill>
+                <a:latin typeface="Courier New"/>
+                <a:cs typeface="Courier New"/>
+              </a:rPr>
+              <a:t>produtos</a:t>
+            </a:r>
+            <a:endParaRPr sz="1800">
+              <a:latin typeface="Courier New"/>
+              <a:cs typeface="Courier New"/>
+            </a:endParaRPr>
+          </a:p>
+          <a:p>
+            <a:pPr marL="12700">
+              <a:lnSpc>
+                <a:spcPct val="100000"/>
+              </a:lnSpc>
+              <a:spcBef>
+                <a:spcPts val="5"/>
+              </a:spcBef>
+            </a:pPr>
+            <a:r>
+              <a:rPr sz="1800" spc="-10" dirty="0">
+                <a:solidFill>
+                  <a:srgbClr val="669668"/>
+                </a:solidFill>
+                <a:latin typeface="Courier New"/>
+                <a:cs typeface="Courier New"/>
+              </a:rPr>
+              <a:t>vendidos</a:t>
+            </a:r>
+            <a:r>
+              <a:rPr sz="1800" spc="-40" dirty="0">
+                <a:solidFill>
+                  <a:srgbClr val="669668"/>
+                </a:solidFill>
+                <a:latin typeface="Courier New"/>
+                <a:cs typeface="Courier New"/>
+              </a:rPr>
+              <a:t> </a:t>
+            </a:r>
+            <a:r>
+              <a:rPr sz="1800" spc="-10" dirty="0">
+                <a:solidFill>
+                  <a:srgbClr val="669668"/>
+                </a:solidFill>
+                <a:latin typeface="Courier New"/>
+                <a:cs typeface="Courier New"/>
+              </a:rPr>
+              <a:t>em</a:t>
+            </a:r>
+            <a:r>
+              <a:rPr sz="1800" spc="-40" dirty="0">
+                <a:solidFill>
+                  <a:srgbClr val="669668"/>
+                </a:solidFill>
+                <a:latin typeface="Courier New"/>
+                <a:cs typeface="Courier New"/>
+              </a:rPr>
+              <a:t> </a:t>
+            </a:r>
+            <a:r>
+              <a:rPr sz="1800" spc="-10" dirty="0">
+                <a:solidFill>
+                  <a:srgbClr val="669668"/>
+                </a:solidFill>
+                <a:latin typeface="Courier New"/>
+                <a:cs typeface="Courier New"/>
+              </a:rPr>
+              <a:t>2023;</a:t>
+            </a:r>
+            <a:endParaRPr sz="1800">
+              <a:latin typeface="Courier New"/>
+              <a:cs typeface="Courier New"/>
+            </a:endParaRPr>
+          </a:p>
+        </p:txBody>
+      </p:sp>
+      <p:sp>
+        <p:nvSpPr>
+          <p:cNvPr id="12" name="object 12"/>
+          <p:cNvSpPr txBox="1">
+            <a:spLocks noGrp="1"/>
+          </p:cNvSpPr>
+          <p:nvPr>
+            <p:ph type="sldNum" sz="quarter" idx="7"/>
+          </p:nvPr>
+        </p:nvSpPr>
+        <p:spPr>
+          <a:prstGeom prst="rect">
+            <a:avLst/>
+          </a:prstGeom>
+        </p:spPr>
+        <p:txBody>
+          <a:bodyPr vert="horz" wrap="square" lIns="0" tIns="0" rIns="0" bIns="0" rtlCol="0">
+            <a:spAutoFit/>
+          </a:bodyPr>
+          <a:lstStyle/>
+          <a:p>
+            <a:pPr marL="38100">
+              <a:lnSpc>
+                <a:spcPts val="3195"/>
+              </a:lnSpc>
+            </a:pPr>
+            <a:r>
+              <a:rPr spc="-5" dirty="0"/>
+              <a:t>12</a:t>
+            </a:r>
+          </a:p>
+        </p:txBody>
+      </p:sp>
+      <p:sp>
+        <p:nvSpPr>
+          <p:cNvPr id="11" name="object 11"/>
+          <p:cNvSpPr txBox="1"/>
+          <p:nvPr/>
+        </p:nvSpPr>
+        <p:spPr>
+          <a:xfrm>
+            <a:off x="6299072" y="4016502"/>
+            <a:ext cx="4939665" cy="1946275"/>
+          </a:xfrm>
+          <a:prstGeom prst="rect">
+            <a:avLst/>
+          </a:prstGeom>
+        </p:spPr>
+        <p:txBody>
+          <a:bodyPr vert="horz" wrap="square" lIns="0" tIns="12700" rIns="0" bIns="0" rtlCol="0">
+            <a:spAutoFit/>
+          </a:bodyPr>
+          <a:lstStyle/>
+          <a:p>
+            <a:pPr marL="12700" marR="5080">
+              <a:lnSpc>
+                <a:spcPct val="100000"/>
+              </a:lnSpc>
+              <a:spcBef>
+                <a:spcPts val="100"/>
+              </a:spcBef>
+            </a:pPr>
+            <a:r>
+              <a:rPr sz="1800" spc="-10" dirty="0">
+                <a:solidFill>
+                  <a:srgbClr val="669668"/>
+                </a:solidFill>
+                <a:latin typeface="Courier New"/>
+                <a:cs typeface="Courier New"/>
+              </a:rPr>
+              <a:t>--4) Relação de meses, quantidade </a:t>
+            </a:r>
+            <a:r>
+              <a:rPr sz="1800" spc="-5" dirty="0">
+                <a:solidFill>
+                  <a:srgbClr val="669668"/>
+                </a:solidFill>
+                <a:latin typeface="Courier New"/>
+                <a:cs typeface="Courier New"/>
+              </a:rPr>
+              <a:t> </a:t>
+            </a:r>
+            <a:r>
+              <a:rPr sz="1800" spc="-10" dirty="0">
+                <a:solidFill>
+                  <a:srgbClr val="669668"/>
+                </a:solidFill>
+                <a:latin typeface="Courier New"/>
+                <a:cs typeface="Courier New"/>
+              </a:rPr>
+              <a:t>total </a:t>
+            </a:r>
+            <a:r>
+              <a:rPr sz="1800" spc="-5" dirty="0">
+                <a:solidFill>
+                  <a:srgbClr val="669668"/>
+                </a:solidFill>
+                <a:latin typeface="Courier New"/>
+                <a:cs typeface="Courier New"/>
+              </a:rPr>
+              <a:t>de </a:t>
+            </a:r>
+            <a:r>
+              <a:rPr sz="1800" spc="-10" dirty="0">
+                <a:solidFill>
+                  <a:srgbClr val="669668"/>
+                </a:solidFill>
+                <a:latin typeface="Courier New"/>
+                <a:cs typeface="Courier New"/>
+              </a:rPr>
+              <a:t>vendas, valor total de </a:t>
+            </a:r>
+            <a:r>
+              <a:rPr sz="1800" spc="-5" dirty="0">
+                <a:solidFill>
+                  <a:srgbClr val="669668"/>
+                </a:solidFill>
+                <a:latin typeface="Courier New"/>
+                <a:cs typeface="Courier New"/>
+              </a:rPr>
+              <a:t> </a:t>
+            </a:r>
+            <a:r>
+              <a:rPr sz="1800" spc="-10" dirty="0">
+                <a:solidFill>
+                  <a:srgbClr val="669668"/>
+                </a:solidFill>
+                <a:latin typeface="Courier New"/>
+                <a:cs typeface="Courier New"/>
+              </a:rPr>
+              <a:t>vendas por mês. Relacionar somente </a:t>
+            </a:r>
+            <a:r>
+              <a:rPr sz="1800" spc="-5" dirty="0">
+                <a:solidFill>
+                  <a:srgbClr val="669668"/>
+                </a:solidFill>
+                <a:latin typeface="Courier New"/>
+                <a:cs typeface="Courier New"/>
+              </a:rPr>
+              <a:t> </a:t>
+            </a:r>
+            <a:r>
+              <a:rPr sz="1800" spc="-10" dirty="0">
+                <a:solidFill>
+                  <a:srgbClr val="669668"/>
+                </a:solidFill>
+                <a:latin typeface="Courier New"/>
+                <a:cs typeface="Courier New"/>
+              </a:rPr>
+              <a:t>meses com quantidade de vendas acima </a:t>
+            </a:r>
+            <a:r>
+              <a:rPr sz="1800" spc="-1070" dirty="0">
+                <a:solidFill>
+                  <a:srgbClr val="669668"/>
+                </a:solidFill>
+                <a:latin typeface="Courier New"/>
+                <a:cs typeface="Courier New"/>
+              </a:rPr>
+              <a:t> </a:t>
+            </a:r>
+            <a:r>
+              <a:rPr sz="1800" spc="-5" dirty="0">
+                <a:solidFill>
+                  <a:srgbClr val="669668"/>
+                </a:solidFill>
+                <a:latin typeface="Courier New"/>
+                <a:cs typeface="Courier New"/>
+              </a:rPr>
+              <a:t>de </a:t>
+            </a:r>
+            <a:r>
+              <a:rPr sz="1800" spc="-10" dirty="0">
+                <a:solidFill>
+                  <a:srgbClr val="669668"/>
+                </a:solidFill>
+                <a:latin typeface="Courier New"/>
+                <a:cs typeface="Courier New"/>
+              </a:rPr>
+              <a:t>100. Ordenar </a:t>
+            </a:r>
+            <a:r>
+              <a:rPr sz="1800" dirty="0">
+                <a:solidFill>
+                  <a:srgbClr val="669668"/>
+                </a:solidFill>
+                <a:latin typeface="Courier New"/>
+                <a:cs typeface="Courier New"/>
+              </a:rPr>
+              <a:t>o </a:t>
+            </a:r>
+            <a:r>
+              <a:rPr sz="1800" spc="-10" dirty="0">
+                <a:solidFill>
+                  <a:srgbClr val="669668"/>
+                </a:solidFill>
+                <a:latin typeface="Courier New"/>
+                <a:cs typeface="Courier New"/>
+              </a:rPr>
+              <a:t>relatório </a:t>
+            </a:r>
+            <a:r>
+              <a:rPr sz="1800" spc="-5" dirty="0">
+                <a:solidFill>
+                  <a:srgbClr val="669668"/>
+                </a:solidFill>
+                <a:latin typeface="Courier New"/>
+                <a:cs typeface="Courier New"/>
+              </a:rPr>
+              <a:t>do </a:t>
+            </a:r>
+            <a:r>
+              <a:rPr sz="1800" spc="-10" dirty="0">
+                <a:solidFill>
+                  <a:srgbClr val="669668"/>
+                </a:solidFill>
+                <a:latin typeface="Courier New"/>
+                <a:cs typeface="Courier New"/>
+              </a:rPr>
+              <a:t>mês </a:t>
+            </a:r>
+            <a:r>
+              <a:rPr sz="1800" spc="-5" dirty="0">
+                <a:solidFill>
+                  <a:srgbClr val="669668"/>
+                </a:solidFill>
+                <a:latin typeface="Courier New"/>
+                <a:cs typeface="Courier New"/>
+              </a:rPr>
+              <a:t> com </a:t>
+            </a:r>
+            <a:r>
+              <a:rPr sz="1800" dirty="0">
+                <a:solidFill>
+                  <a:srgbClr val="669668"/>
+                </a:solidFill>
+                <a:latin typeface="Courier New"/>
+                <a:cs typeface="Courier New"/>
+              </a:rPr>
+              <a:t>o </a:t>
+            </a:r>
+            <a:r>
+              <a:rPr sz="1800" spc="-10" dirty="0">
+                <a:solidFill>
+                  <a:srgbClr val="669668"/>
+                </a:solidFill>
+                <a:latin typeface="Courier New"/>
+                <a:cs typeface="Courier New"/>
+              </a:rPr>
+              <a:t>maior valor(R$) </a:t>
+            </a:r>
+            <a:r>
+              <a:rPr sz="1800" spc="-5" dirty="0">
+                <a:solidFill>
+                  <a:srgbClr val="669668"/>
+                </a:solidFill>
+                <a:latin typeface="Courier New"/>
+                <a:cs typeface="Courier New"/>
+              </a:rPr>
+              <a:t>em </a:t>
+            </a:r>
+            <a:r>
+              <a:rPr sz="1800" spc="-10" dirty="0">
+                <a:solidFill>
+                  <a:srgbClr val="669668"/>
+                </a:solidFill>
+                <a:latin typeface="Courier New"/>
+                <a:cs typeface="Courier New"/>
+              </a:rPr>
+              <a:t>vendas para </a:t>
+            </a:r>
+            <a:r>
+              <a:rPr sz="1800" spc="-1070" dirty="0">
+                <a:solidFill>
+                  <a:srgbClr val="669668"/>
+                </a:solidFill>
+                <a:latin typeface="Courier New"/>
+                <a:cs typeface="Courier New"/>
+              </a:rPr>
+              <a:t> </a:t>
+            </a:r>
+            <a:r>
+              <a:rPr sz="1800" dirty="0">
+                <a:solidFill>
+                  <a:srgbClr val="669668"/>
+                </a:solidFill>
+                <a:latin typeface="Courier New"/>
+                <a:cs typeface="Courier New"/>
+              </a:rPr>
+              <a:t>o</a:t>
+            </a:r>
+            <a:r>
+              <a:rPr sz="1800" spc="-10" dirty="0">
+                <a:solidFill>
+                  <a:srgbClr val="669668"/>
+                </a:solidFill>
+                <a:latin typeface="Courier New"/>
+                <a:cs typeface="Courier New"/>
+              </a:rPr>
+              <a:t> mês</a:t>
+            </a:r>
+            <a:r>
+              <a:rPr sz="1800" spc="-20" dirty="0">
+                <a:solidFill>
+                  <a:srgbClr val="669668"/>
+                </a:solidFill>
+                <a:latin typeface="Courier New"/>
+                <a:cs typeface="Courier New"/>
+              </a:rPr>
+              <a:t> </a:t>
+            </a:r>
+            <a:r>
+              <a:rPr sz="1800" spc="-10" dirty="0">
+                <a:solidFill>
+                  <a:srgbClr val="669668"/>
+                </a:solidFill>
+                <a:latin typeface="Courier New"/>
+                <a:cs typeface="Courier New"/>
+              </a:rPr>
+              <a:t>com</a:t>
+            </a:r>
+            <a:r>
+              <a:rPr sz="1800" spc="-20" dirty="0">
+                <a:solidFill>
+                  <a:srgbClr val="669668"/>
+                </a:solidFill>
+                <a:latin typeface="Courier New"/>
+                <a:cs typeface="Courier New"/>
+              </a:rPr>
+              <a:t> </a:t>
+            </a:r>
+            <a:r>
+              <a:rPr sz="1800" spc="-10" dirty="0">
+                <a:solidFill>
+                  <a:srgbClr val="669668"/>
+                </a:solidFill>
+                <a:latin typeface="Courier New"/>
+                <a:cs typeface="Courier New"/>
+              </a:rPr>
+              <a:t>menos</a:t>
+            </a:r>
+            <a:r>
+              <a:rPr sz="1800" spc="-15" dirty="0">
+                <a:solidFill>
+                  <a:srgbClr val="669668"/>
+                </a:solidFill>
+                <a:latin typeface="Courier New"/>
+                <a:cs typeface="Courier New"/>
+              </a:rPr>
+              <a:t> </a:t>
+            </a:r>
+            <a:r>
+              <a:rPr sz="1800" spc="-10" dirty="0">
+                <a:solidFill>
+                  <a:srgbClr val="669668"/>
+                </a:solidFill>
+                <a:latin typeface="Courier New"/>
+                <a:cs typeface="Courier New"/>
+              </a:rPr>
+              <a:t>vendas.</a:t>
+            </a:r>
+            <a:endParaRPr sz="1800">
+              <a:latin typeface="Courier New"/>
+              <a:cs typeface="Courier New"/>
+            </a:endParaRPr>
+          </a:p>
+        </p:txBody>
+      </p:sp>
+    </p:spTree>
+  </p:cSld>
+  <p:clrMapOvr>
+    <a:masterClrMapping/>
+  </p:clrMapOvr>
+</p:sld>
+</file>
+
+<file path=ppt/slides/slide11.xml><?xml version="1.0" encoding="utf-8"?>
+<p:sld xmlns:a="http://schemas.openxmlformats.org/drawingml/2006/main" xmlns:r="http://schemas.openxmlformats.org/officeDocument/2006/relationships" xmlns:p="http://schemas.openxmlformats.org/presentationml/2006/main">
+  <p:cSld>
+    <p:spTree>
+      <p:nvGrpSpPr>
+        <p:cNvPr id="1" name=""/>
+        <p:cNvGrpSpPr/>
+        <p:nvPr/>
+      </p:nvGrpSpPr>
+      <p:grpSpPr>
+        <a:xfrm>
+          <a:off x="0" y="0"/>
+          <a:ext cx="0" cy="0"/>
+          <a:chOff x="0" y="0"/>
+          <a:chExt cx="0" cy="0"/>
+        </a:xfrm>
+      </p:grpSpPr>
+      <p:sp>
+        <p:nvSpPr>
+          <p:cNvPr id="2" name="object 2"/>
+          <p:cNvSpPr txBox="1">
+            <a:spLocks noGrp="1"/>
+          </p:cNvSpPr>
+          <p:nvPr>
+            <p:ph type="title"/>
+          </p:nvPr>
+        </p:nvSpPr>
+        <p:spPr>
+          <a:xfrm>
             <a:off x="1940432" y="572846"/>
             <a:ext cx="7798434" cy="574675"/>
           </a:xfrm>
@@ -2570,7 +3404,7 @@
               </a:rPr>
               <a:t>dados;</a:t>
             </a:r>
-            <a:endParaRPr sz="2000">
+            <a:endParaRPr sz="2000" dirty="0">
               <a:latin typeface="Arial MT"/>
               <a:cs typeface="Arial MT"/>
             </a:endParaRPr>
@@ -2581,7 +3415,7 @@
                 <a:spcPct val="100000"/>
               </a:lnSpc>
             </a:pPr>
-            <a:endParaRPr sz="2200">
+            <a:endParaRPr sz="2200" dirty="0">
               <a:latin typeface="Arial MT"/>
               <a:cs typeface="Arial MT"/>
             </a:endParaRPr>
@@ -2595,7 +3429,7 @@
                 <a:spcPts val="25"/>
               </a:spcBef>
             </a:pPr>
-            <a:endParaRPr sz="1950">
+            <a:endParaRPr sz="1950" dirty="0">
               <a:latin typeface="Arial MT"/>
               <a:cs typeface="Arial MT"/>
             </a:endParaRPr>
@@ -2699,7 +3533,7 @@
               </a:rPr>
               <a:t>abordados</a:t>
             </a:r>
-            <a:endParaRPr sz="2000">
+            <a:endParaRPr sz="2000" dirty="0">
               <a:latin typeface="Arial MT"/>
               <a:cs typeface="Arial MT"/>
             </a:endParaRPr>
@@ -2743,7 +3577,7 @@
               </a:rPr>
               <a:t>matéria;</a:t>
             </a:r>
-            <a:endParaRPr sz="2000">
+            <a:endParaRPr sz="2000" dirty="0">
               <a:latin typeface="Arial MT"/>
               <a:cs typeface="Arial MT"/>
             </a:endParaRPr>
@@ -3616,7 +4450,7 @@
         <p:spPr>
           <a:xfrm>
             <a:off x="849579" y="4741855"/>
-            <a:ext cx="5168900" cy="1398270"/>
+            <a:ext cx="5168900" cy="1341457"/>
           </a:xfrm>
           <a:prstGeom prst="rect">
             <a:avLst/>
@@ -3637,296 +4471,16 @@
               </a:spcBef>
             </a:pPr>
             <a:r>
-              <a:rPr sz="2000" dirty="0">
+              <a:rPr lang="pt-BR" sz="2000" dirty="0">
                 <a:solidFill>
                   <a:srgbClr val="FF0000"/>
                 </a:solidFill>
                 <a:latin typeface="Arial MT"/>
                 <a:cs typeface="Arial MT"/>
               </a:rPr>
-              <a:t>A</a:t>
-            </a:r>
-            <a:r>
-              <a:rPr sz="2000" spc="5" dirty="0">
-                <a:solidFill>
-                  <a:srgbClr val="FF0000"/>
-                </a:solidFill>
-                <a:latin typeface="Arial MT"/>
-                <a:cs typeface="Arial MT"/>
-              </a:rPr>
-              <a:t> </a:t>
-            </a:r>
-            <a:r>
-              <a:rPr sz="2000" spc="-5" dirty="0">
-                <a:solidFill>
-                  <a:srgbClr val="FF0000"/>
-                </a:solidFill>
-                <a:latin typeface="Arial MT"/>
-                <a:cs typeface="Arial MT"/>
-              </a:rPr>
-              <a:t>estrutura</a:t>
-            </a:r>
-            <a:r>
-              <a:rPr sz="2000" dirty="0">
-                <a:solidFill>
-                  <a:srgbClr val="FF0000"/>
-                </a:solidFill>
-                <a:latin typeface="Arial MT"/>
-                <a:cs typeface="Arial MT"/>
-              </a:rPr>
-              <a:t> do</a:t>
-            </a:r>
-            <a:r>
-              <a:rPr sz="2000" spc="5" dirty="0">
-                <a:solidFill>
-                  <a:srgbClr val="FF0000"/>
-                </a:solidFill>
-                <a:latin typeface="Arial MT"/>
-                <a:cs typeface="Arial MT"/>
-              </a:rPr>
-              <a:t> </a:t>
-            </a:r>
-            <a:r>
-              <a:rPr sz="2000" dirty="0">
-                <a:solidFill>
-                  <a:srgbClr val="FF0000"/>
-                </a:solidFill>
-                <a:latin typeface="Arial MT"/>
-                <a:cs typeface="Arial MT"/>
-              </a:rPr>
-              <a:t>banco</a:t>
-            </a:r>
-            <a:r>
-              <a:rPr sz="2000" spc="5" dirty="0">
-                <a:solidFill>
-                  <a:srgbClr val="FF0000"/>
-                </a:solidFill>
-                <a:latin typeface="Arial MT"/>
-                <a:cs typeface="Arial MT"/>
-              </a:rPr>
-              <a:t> </a:t>
-            </a:r>
-            <a:r>
-              <a:rPr sz="2000" dirty="0">
-                <a:solidFill>
-                  <a:srgbClr val="FF0000"/>
-                </a:solidFill>
-                <a:latin typeface="Arial MT"/>
-                <a:cs typeface="Arial MT"/>
-              </a:rPr>
-              <a:t>de</a:t>
-            </a:r>
-            <a:r>
-              <a:rPr sz="2000" spc="5" dirty="0">
-                <a:solidFill>
-                  <a:srgbClr val="FF0000"/>
-                </a:solidFill>
-                <a:latin typeface="Arial MT"/>
-                <a:cs typeface="Arial MT"/>
-              </a:rPr>
-              <a:t> </a:t>
-            </a:r>
-            <a:r>
-              <a:rPr sz="2000" dirty="0">
-                <a:solidFill>
-                  <a:srgbClr val="FF0000"/>
-                </a:solidFill>
-                <a:latin typeface="Arial MT"/>
-                <a:cs typeface="Arial MT"/>
-              </a:rPr>
-              <a:t>dados</a:t>
-            </a:r>
-            <a:r>
-              <a:rPr sz="2000" spc="5" dirty="0">
-                <a:solidFill>
-                  <a:srgbClr val="FF0000"/>
-                </a:solidFill>
-                <a:latin typeface="Arial MT"/>
-                <a:cs typeface="Arial MT"/>
-              </a:rPr>
-              <a:t> </a:t>
-            </a:r>
-            <a:r>
-              <a:rPr sz="2000" dirty="0">
-                <a:solidFill>
-                  <a:srgbClr val="FF0000"/>
-                </a:solidFill>
-                <a:latin typeface="Arial MT"/>
-                <a:cs typeface="Arial MT"/>
-              </a:rPr>
-              <a:t>e</a:t>
-            </a:r>
-            <a:r>
-              <a:rPr sz="2000" spc="560" dirty="0">
-                <a:solidFill>
-                  <a:srgbClr val="FF0000"/>
-                </a:solidFill>
-                <a:latin typeface="Arial MT"/>
-                <a:cs typeface="Arial MT"/>
-              </a:rPr>
-              <a:t> </a:t>
-            </a:r>
-            <a:r>
-              <a:rPr sz="2000" dirty="0">
-                <a:solidFill>
-                  <a:srgbClr val="FF0000"/>
-                </a:solidFill>
-                <a:latin typeface="Arial MT"/>
-                <a:cs typeface="Arial MT"/>
-              </a:rPr>
-              <a:t>as </a:t>
-            </a:r>
-            <a:r>
-              <a:rPr sz="2000" spc="5" dirty="0">
-                <a:solidFill>
-                  <a:srgbClr val="FF0000"/>
-                </a:solidFill>
-                <a:latin typeface="Arial MT"/>
-                <a:cs typeface="Arial MT"/>
-              </a:rPr>
-              <a:t> </a:t>
-            </a:r>
-            <a:r>
-              <a:rPr sz="2000" spc="-5" dirty="0">
-                <a:solidFill>
-                  <a:srgbClr val="FF0000"/>
-                </a:solidFill>
-                <a:latin typeface="Arial MT"/>
-                <a:cs typeface="Arial MT"/>
-              </a:rPr>
-              <a:t>consultas apresentadas </a:t>
-            </a:r>
-            <a:r>
-              <a:rPr sz="2000" dirty="0">
-                <a:solidFill>
-                  <a:srgbClr val="FF0000"/>
-                </a:solidFill>
-                <a:latin typeface="Arial MT"/>
-                <a:cs typeface="Arial MT"/>
-              </a:rPr>
-              <a:t>podem não </a:t>
-            </a:r>
-            <a:r>
-              <a:rPr sz="2000" spc="-5" dirty="0">
-                <a:solidFill>
-                  <a:srgbClr val="FF0000"/>
-                </a:solidFill>
-                <a:latin typeface="Arial MT"/>
-                <a:cs typeface="Arial MT"/>
-              </a:rPr>
-              <a:t>abordar </a:t>
-            </a:r>
-            <a:r>
-              <a:rPr sz="2000" dirty="0">
-                <a:solidFill>
-                  <a:srgbClr val="FF0000"/>
-                </a:solidFill>
-                <a:latin typeface="Arial MT"/>
-                <a:cs typeface="Arial MT"/>
-              </a:rPr>
-              <a:t> todas</a:t>
-            </a:r>
-            <a:r>
-              <a:rPr sz="2000" spc="-30" dirty="0">
-                <a:solidFill>
-                  <a:srgbClr val="FF0000"/>
-                </a:solidFill>
-                <a:latin typeface="Arial MT"/>
-                <a:cs typeface="Arial MT"/>
-              </a:rPr>
-              <a:t> </a:t>
-            </a:r>
-            <a:r>
-              <a:rPr sz="2000" dirty="0">
-                <a:solidFill>
-                  <a:srgbClr val="FF0000"/>
-                </a:solidFill>
-                <a:latin typeface="Arial MT"/>
-                <a:cs typeface="Arial MT"/>
-              </a:rPr>
-              <a:t>as</a:t>
-            </a:r>
-            <a:r>
-              <a:rPr sz="2000" spc="-20" dirty="0">
-                <a:solidFill>
-                  <a:srgbClr val="FF0000"/>
-                </a:solidFill>
-                <a:latin typeface="Arial MT"/>
-                <a:cs typeface="Arial MT"/>
-              </a:rPr>
-              <a:t> </a:t>
-            </a:r>
-            <a:r>
-              <a:rPr sz="2000" dirty="0">
-                <a:solidFill>
-                  <a:srgbClr val="FF0000"/>
-                </a:solidFill>
-                <a:latin typeface="Arial MT"/>
-                <a:cs typeface="Arial MT"/>
-              </a:rPr>
-              <a:t>necessidades</a:t>
-            </a:r>
-            <a:r>
-              <a:rPr sz="2000" spc="-30" dirty="0">
-                <a:solidFill>
-                  <a:srgbClr val="FF0000"/>
-                </a:solidFill>
-                <a:latin typeface="Arial MT"/>
-                <a:cs typeface="Arial MT"/>
-              </a:rPr>
-              <a:t> </a:t>
-            </a:r>
-            <a:r>
-              <a:rPr sz="2000" dirty="0">
-                <a:solidFill>
-                  <a:srgbClr val="FF0000"/>
-                </a:solidFill>
-                <a:latin typeface="Arial MT"/>
-                <a:cs typeface="Arial MT"/>
-              </a:rPr>
-              <a:t>específicas</a:t>
-            </a:r>
-            <a:r>
-              <a:rPr sz="2000" spc="-45" dirty="0">
-                <a:solidFill>
-                  <a:srgbClr val="FF0000"/>
-                </a:solidFill>
-                <a:latin typeface="Arial MT"/>
-                <a:cs typeface="Arial MT"/>
-              </a:rPr>
-              <a:t> </a:t>
-            </a:r>
-            <a:r>
-              <a:rPr sz="2000" dirty="0">
-                <a:solidFill>
-                  <a:srgbClr val="FF0000"/>
-                </a:solidFill>
-                <a:latin typeface="Arial MT"/>
-                <a:cs typeface="Arial MT"/>
-              </a:rPr>
-              <a:t>do</a:t>
-            </a:r>
-            <a:r>
-              <a:rPr sz="2000" spc="-15" dirty="0">
-                <a:solidFill>
-                  <a:srgbClr val="FF0000"/>
-                </a:solidFill>
-                <a:latin typeface="Arial MT"/>
-                <a:cs typeface="Arial MT"/>
-              </a:rPr>
-              <a:t> </a:t>
-            </a:r>
-            <a:r>
-              <a:rPr sz="2000" dirty="0">
-                <a:solidFill>
-                  <a:srgbClr val="FF0000"/>
-                </a:solidFill>
-                <a:latin typeface="Arial MT"/>
-                <a:cs typeface="Arial MT"/>
-              </a:rPr>
-              <a:t>sys.</a:t>
-            </a:r>
-            <a:endParaRPr sz="2000">
+              <a:t>O projeto pode apresentar falhas e/ou erros, por mais que o tempo foi suficiente, não conseguimos deixar 100% funcional. </a:t>
+            </a:r>
+            <a:endParaRPr sz="2000" dirty="0">
               <a:latin typeface="Arial MT"/>
               <a:cs typeface="Arial MT"/>
             </a:endParaRPr>
@@ -3974,7 +4528,7 @@
 </p:sld>
 </file>
 
-<file path=ppt/slides/slide11.xml><?xml version="1.0" encoding="utf-8"?>
+<file path=ppt/slides/slide12.xml><?xml version="1.0" encoding="utf-8"?>
 <p:sld xmlns:a="http://schemas.openxmlformats.org/drawingml/2006/main" xmlns:r="http://schemas.openxmlformats.org/officeDocument/2006/relationships" xmlns:p="http://schemas.openxmlformats.org/presentationml/2006/main">
   <p:cSld>
     <p:spTree>
@@ -4088,8 +4642,8 @@
         </p:nvSpPr>
         <p:spPr>
           <a:xfrm>
-            <a:off x="3886200" y="3505201"/>
-            <a:ext cx="4267200" cy="517449"/>
+            <a:off x="2438400" y="5638800"/>
+            <a:ext cx="7696200" cy="443070"/>
           </a:xfrm>
           <a:prstGeom prst="rect">
             <a:avLst/>
@@ -4110,9 +4664,9 @@
               </a:spcBef>
             </a:pPr>
             <a:r>
-              <a:rPr sz="1600" u="heavy" spc="-5" dirty="0">
-                <a:solidFill>
-                  <a:srgbClr val="FFFFFF"/>
+              <a:rPr sz="2800" i="1" u="heavy" spc="-5" dirty="0">
+                <a:solidFill>
+                  <a:schemeClr val="bg1"/>
                 </a:solidFill>
                 <a:uFill>
                   <a:solidFill>
@@ -4121,39 +4675,166 @@
                 </a:uFill>
                 <a:latin typeface="Arial MT"/>
                 <a:cs typeface="Arial MT"/>
-                <a:hlinkClick r:id="rId2"/>
-              </a:rPr>
-              <a:t>https://github.com/brunogkonzen/BreadTrack/</a:t>
-            </a:r>
-            <a:endParaRPr lang="pt-BR" sz="1600" u="heavy" spc="-5" dirty="0">
+                <a:hlinkClick r:id="rId2">
+                  <a:extLst>
+                    <a:ext uri="{A12FA001-AC4F-418D-AE19-62706E023703}">
+                      <ahyp:hlinkClr xmlns:ahyp="http://schemas.microsoft.com/office/drawing/2018/hyperlinkcolor" val="tx"/>
+                    </a:ext>
+                  </a:extLst>
+                </a:hlinkClick>
+              </a:rPr>
+              <a:t>https://</a:t>
+            </a:r>
+            <a:r>
+              <a:rPr lang="pt-BR" sz="2800" i="1" u="heavy" spc="-5" dirty="0">
+                <a:solidFill>
+                  <a:schemeClr val="bg1"/>
+                </a:solidFill>
+                <a:uFill>
+                  <a:solidFill>
+                    <a:srgbClr val="FFFFFF"/>
+                  </a:solidFill>
+                </a:uFill>
+                <a:latin typeface="Arial MT"/>
+                <a:cs typeface="Arial MT"/>
+                <a:hlinkClick r:id="rId2">
+                  <a:extLst>
+                    <a:ext uri="{A12FA001-AC4F-418D-AE19-62706E023703}">
+                      <ahyp:hlinkClr xmlns:ahyp="http://schemas.microsoft.com/office/drawing/2018/hyperlinkcolor" val="tx"/>
+                    </a:ext>
+                  </a:extLst>
+                </a:hlinkClick>
+              </a:rPr>
+              <a:t>g</a:t>
+            </a:r>
+            <a:r>
+              <a:rPr sz="2800" i="1" u="heavy" spc="-5" dirty="0">
+                <a:solidFill>
+                  <a:schemeClr val="bg1"/>
+                </a:solidFill>
+                <a:uFill>
+                  <a:solidFill>
+                    <a:srgbClr val="FFFFFF"/>
+                  </a:solidFill>
+                </a:uFill>
+                <a:latin typeface="Arial MT"/>
+                <a:cs typeface="Arial MT"/>
+                <a:hlinkClick r:id="rId2">
+                  <a:extLst>
+                    <a:ext uri="{A12FA001-AC4F-418D-AE19-62706E023703}">
+                      <ahyp:hlinkClr xmlns:ahyp="http://schemas.microsoft.com/office/drawing/2018/hyperlinkcolor" val="tx"/>
+                    </a:ext>
+                  </a:extLst>
+                </a:hlinkClick>
+              </a:rPr>
+              <a:t>ithub.com/brunogkonzen/</a:t>
+            </a:r>
+            <a:r>
+              <a:rPr lang="pt-BR" sz="2800" i="1" u="heavy" spc="-5" dirty="0">
+                <a:solidFill>
+                  <a:schemeClr val="bg1"/>
+                </a:solidFill>
+                <a:uFill>
+                  <a:solidFill>
+                    <a:srgbClr val="FFFFFF"/>
+                  </a:solidFill>
+                </a:uFill>
+                <a:latin typeface="Arial MT"/>
+                <a:cs typeface="Arial MT"/>
+                <a:hlinkClick r:id="rId2">
+                  <a:extLst>
+                    <a:ext uri="{A12FA001-AC4F-418D-AE19-62706E023703}">
+                      <ahyp:hlinkClr xmlns:ahyp="http://schemas.microsoft.com/office/drawing/2018/hyperlinkcolor" val="tx"/>
+                    </a:ext>
+                  </a:extLst>
+                </a:hlinkClick>
+              </a:rPr>
+              <a:t>BreadTrack</a:t>
+            </a:r>
+            <a:r>
+              <a:rPr sz="2800" i="1" u="heavy" spc="-5" dirty="0">
+                <a:solidFill>
+                  <a:schemeClr val="bg1"/>
+                </a:solidFill>
+                <a:uFill>
+                  <a:solidFill>
+                    <a:srgbClr val="FFFFFF"/>
+                  </a:solidFill>
+                </a:uFill>
+                <a:latin typeface="Arial MT"/>
+                <a:cs typeface="Arial MT"/>
+                <a:hlinkClick r:id="rId2">
+                  <a:extLst>
+                    <a:ext uri="{A12FA001-AC4F-418D-AE19-62706E023703}">
+                      <ahyp:hlinkClr xmlns:ahyp="http://schemas.microsoft.com/office/drawing/2018/hyperlinkcolor" val="tx"/>
+                    </a:ext>
+                  </a:extLst>
+                </a:hlinkClick>
+              </a:rPr>
+              <a:t>/</a:t>
+            </a:r>
+            <a:endParaRPr lang="pt-BR" sz="2800" i="1" u="heavy" spc="-5" dirty="0">
               <a:solidFill>
-                <a:srgbClr val="FFFFFF"/>
+                <a:schemeClr val="bg1"/>
               </a:solidFill>
               <a:uFill>
                 <a:solidFill>
                   <a:srgbClr val="FFFFFF"/>
                 </a:solidFill>
               </a:uFill>
-              <a:latin typeface="Arial MT"/>
-              <a:cs typeface="Arial MT"/>
-            </a:endParaRPr>
-          </a:p>
-          <a:p>
-            <a:pPr marL="12700">
-              <a:lnSpc>
-                <a:spcPct val="100000"/>
-              </a:lnSpc>
-              <a:spcBef>
-                <a:spcPts val="95"/>
-              </a:spcBef>
-            </a:pPr>
-            <a:endParaRPr sz="1600" dirty="0">
               <a:latin typeface="Arial MT"/>
               <a:cs typeface="Arial MT"/>
             </a:endParaRPr>
           </a:p>
         </p:txBody>
       </p:sp>
+      <p:pic>
+        <p:nvPicPr>
+          <p:cNvPr id="1028" name="Picture 4" descr="Logotipo do github - ícones de mídia social grátis">
+            <a:extLst>
+              <a:ext uri="{FF2B5EF4-FFF2-40B4-BE49-F238E27FC236}">
+                <a16:creationId xmlns:a16="http://schemas.microsoft.com/office/drawing/2014/main" id="{251F516C-6A81-8D52-4B62-57A64C6E8128}"/>
+              </a:ext>
+            </a:extLst>
+          </p:cNvPr>
+          <p:cNvPicPr>
+            <a:picLocks noChangeAspect="1" noChangeArrowheads="1"/>
+          </p:cNvPicPr>
+          <p:nvPr/>
+        </p:nvPicPr>
+        <p:blipFill>
+          <a:blip r:embed="rId3">
+            <a:extLst>
+              <a:ext uri="{28A0092B-C50C-407E-A947-70E740481C1C}">
+                <a14:useLocalDpi xmlns:a14="http://schemas.microsoft.com/office/drawing/2010/main" val="0"/>
+              </a:ext>
+            </a:extLst>
+          </a:blip>
+          <a:srcRect/>
+          <a:stretch>
+            <a:fillRect/>
+          </a:stretch>
+        </p:blipFill>
+        <p:spPr bwMode="auto">
+          <a:xfrm>
+            <a:off x="4152900" y="1485900"/>
+            <a:ext cx="3886200" cy="3886200"/>
+          </a:xfrm>
+          <a:prstGeom prst="rect">
+            <a:avLst/>
+          </a:prstGeom>
+          <a:noFill/>
+          <a:extLst>
+            <a:ext uri="{909E8E84-426E-40DD-AFC4-6F175D3DCCD1}">
+              <a14:hiddenFill xmlns:a14="http://schemas.microsoft.com/office/drawing/2010/main">
+                <a:solidFill>
+                  <a:srgbClr val="FFFFFF"/>
+                </a:solidFill>
+              </a14:hiddenFill>
+            </a:ext>
+          </a:extLst>
+        </p:spPr>
+      </p:pic>
     </p:spTree>
   </p:cSld>
   <p:clrMapOvr>
@@ -4162,7 +4843,7 @@
 </p:sld>
 </file>
 
-<file path=ppt/slides/slide12.xml><?xml version="1.0" encoding="utf-8"?>
+<file path=ppt/slides/slide13.xml><?xml version="1.0" encoding="utf-8"?>
 <p:sld xmlns:a="http://schemas.openxmlformats.org/drawingml/2006/main" xmlns:r="http://schemas.openxmlformats.org/officeDocument/2006/relationships" xmlns:p="http://schemas.openxmlformats.org/presentationml/2006/main">
   <p:cSld>
     <p:spTree>
@@ -5526,7 +6207,1376 @@
 </p:sld>
 </file>
 
-<file path=ppt/slides/slide13.xml><?xml version="1.0" encoding="utf-8"?>
+<file path=ppt/slides/slide14.xml><?xml version="1.0" encoding="utf-8"?>
+<p:sld xmlns:a="http://schemas.openxmlformats.org/drawingml/2006/main" xmlns:r="http://schemas.openxmlformats.org/officeDocument/2006/relationships" xmlns:p="http://schemas.openxmlformats.org/presentationml/2006/main">
+  <p:cSld>
+    <p:spTree>
+      <p:nvGrpSpPr>
+        <p:cNvPr id="1" name=""/>
+        <p:cNvGrpSpPr/>
+        <p:nvPr/>
+      </p:nvGrpSpPr>
+      <p:grpSpPr>
+        <a:xfrm>
+          <a:off x="0" y="0"/>
+          <a:ext cx="0" cy="0"/>
+          <a:chOff x="0" y="0"/>
+          <a:chExt cx="0" cy="0"/>
+        </a:xfrm>
+      </p:grpSpPr>
+      <p:sp>
+        <p:nvSpPr>
+          <p:cNvPr id="2" name="object 2"/>
+          <p:cNvSpPr txBox="1">
+            <a:spLocks noGrp="1"/>
+          </p:cNvSpPr>
+          <p:nvPr>
+            <p:ph type="title"/>
+          </p:nvPr>
+        </p:nvSpPr>
+        <p:spPr>
+          <a:xfrm>
+            <a:off x="960831" y="572846"/>
+            <a:ext cx="3304540" cy="574675"/>
+          </a:xfrm>
+          <a:prstGeom prst="rect">
+            <a:avLst/>
+          </a:prstGeom>
+        </p:spPr>
+        <p:txBody>
+          <a:bodyPr vert="horz" wrap="square" lIns="0" tIns="12700" rIns="0" bIns="0" rtlCol="0">
+            <a:spAutoFit/>
+          </a:bodyPr>
+          <a:lstStyle/>
+          <a:p>
+            <a:pPr marL="12700">
+              <a:lnSpc>
+                <a:spcPct val="100000"/>
+              </a:lnSpc>
+              <a:spcBef>
+                <a:spcPts val="100"/>
+              </a:spcBef>
+            </a:pPr>
+            <a:r>
+              <a:rPr dirty="0"/>
+              <a:t>REFERÊNCIAS</a:t>
+            </a:r>
+          </a:p>
+        </p:txBody>
+      </p:sp>
+      <p:sp>
+        <p:nvSpPr>
+          <p:cNvPr id="3" name="object 3"/>
+          <p:cNvSpPr txBox="1"/>
+          <p:nvPr/>
+        </p:nvSpPr>
+        <p:spPr>
+          <a:xfrm>
+            <a:off x="960831" y="1557655"/>
+            <a:ext cx="10158095" cy="4446270"/>
+          </a:xfrm>
+          <a:prstGeom prst="rect">
+            <a:avLst/>
+          </a:prstGeom>
+        </p:spPr>
+        <p:txBody>
+          <a:bodyPr vert="horz" wrap="square" lIns="0" tIns="12700" rIns="0" bIns="0" rtlCol="0">
+            <a:spAutoFit/>
+          </a:bodyPr>
+          <a:lstStyle/>
+          <a:p>
+            <a:pPr marL="12700" marR="6350" algn="just">
+              <a:lnSpc>
+                <a:spcPct val="150000"/>
+              </a:lnSpc>
+              <a:spcBef>
+                <a:spcPts val="100"/>
+              </a:spcBef>
+            </a:pPr>
+            <a:r>
+              <a:rPr sz="1800" spc="-25" dirty="0">
+                <a:solidFill>
+                  <a:srgbClr val="FFFFFF"/>
+                </a:solidFill>
+                <a:latin typeface="Arial MT"/>
+                <a:cs typeface="Arial MT"/>
+              </a:rPr>
+              <a:t>ALVES, </a:t>
+            </a:r>
+            <a:r>
+              <a:rPr sz="1800" spc="-5" dirty="0">
+                <a:solidFill>
+                  <a:srgbClr val="FFFFFF"/>
+                </a:solidFill>
+                <a:latin typeface="Arial MT"/>
+                <a:cs typeface="Arial MT"/>
+              </a:rPr>
+              <a:t>Roberson </a:t>
+            </a:r>
+            <a:r>
+              <a:rPr sz="1800" dirty="0">
+                <a:solidFill>
+                  <a:srgbClr val="FFFFFF"/>
+                </a:solidFill>
+                <a:latin typeface="Arial MT"/>
+                <a:cs typeface="Arial MT"/>
+              </a:rPr>
+              <a:t>J. </a:t>
+            </a:r>
+            <a:r>
+              <a:rPr sz="1800" spc="-100" dirty="0">
+                <a:solidFill>
+                  <a:srgbClr val="FFFFFF"/>
+                </a:solidFill>
+                <a:latin typeface="Arial MT"/>
+                <a:cs typeface="Arial MT"/>
+              </a:rPr>
+              <a:t>F.</a:t>
+            </a:r>
+            <a:r>
+              <a:rPr sz="1800" spc="-95" dirty="0">
+                <a:solidFill>
+                  <a:srgbClr val="FFFFFF"/>
+                </a:solidFill>
+                <a:latin typeface="Arial MT"/>
+                <a:cs typeface="Arial MT"/>
+              </a:rPr>
+              <a:t> </a:t>
+            </a:r>
+            <a:r>
+              <a:rPr sz="1800" b="1" spc="-5" dirty="0">
+                <a:solidFill>
+                  <a:srgbClr val="FFFFFF"/>
+                </a:solidFill>
+                <a:latin typeface="Arial"/>
+                <a:cs typeface="Arial"/>
+              </a:rPr>
+              <a:t>Apostila </a:t>
+            </a:r>
+            <a:r>
+              <a:rPr sz="1800" b="1" dirty="0">
+                <a:solidFill>
+                  <a:srgbClr val="FFFFFF"/>
+                </a:solidFill>
+                <a:latin typeface="Arial"/>
+                <a:cs typeface="Arial"/>
+              </a:rPr>
+              <a:t>de Banco de </a:t>
+            </a:r>
+            <a:r>
+              <a:rPr sz="1800" b="1" spc="-5" dirty="0">
+                <a:solidFill>
+                  <a:srgbClr val="FFFFFF"/>
+                </a:solidFill>
+                <a:latin typeface="Arial"/>
+                <a:cs typeface="Arial"/>
+              </a:rPr>
+              <a:t>Dados. São </a:t>
+            </a:r>
+            <a:r>
+              <a:rPr sz="1800" b="1" dirty="0">
+                <a:solidFill>
+                  <a:srgbClr val="FFFFFF"/>
+                </a:solidFill>
+                <a:latin typeface="Arial"/>
+                <a:cs typeface="Arial"/>
+              </a:rPr>
+              <a:t>Miguel </a:t>
+            </a:r>
+            <a:r>
+              <a:rPr sz="1800" b="1" spc="-5" dirty="0">
+                <a:solidFill>
+                  <a:srgbClr val="FFFFFF"/>
+                </a:solidFill>
+                <a:latin typeface="Arial"/>
+                <a:cs typeface="Arial"/>
+              </a:rPr>
+              <a:t>do Oeste: Unoesc, 2023. </a:t>
+            </a:r>
+            <a:r>
+              <a:rPr sz="1800" b="1" dirty="0">
+                <a:solidFill>
+                  <a:srgbClr val="FFFFFF"/>
+                </a:solidFill>
+                <a:latin typeface="Arial"/>
+                <a:cs typeface="Arial"/>
+              </a:rPr>
+              <a:t> </a:t>
+            </a:r>
+            <a:r>
+              <a:rPr sz="1800" b="1" spc="-5" dirty="0">
+                <a:solidFill>
+                  <a:srgbClr val="FFFFFF"/>
+                </a:solidFill>
+                <a:latin typeface="Arial"/>
+                <a:cs typeface="Arial"/>
+              </a:rPr>
+              <a:t>Material</a:t>
+            </a:r>
+            <a:r>
+              <a:rPr sz="1800" b="1" dirty="0">
+                <a:solidFill>
+                  <a:srgbClr val="FFFFFF"/>
+                </a:solidFill>
+                <a:latin typeface="Arial"/>
+                <a:cs typeface="Arial"/>
+              </a:rPr>
+              <a:t> didático</a:t>
+            </a:r>
+            <a:r>
+              <a:rPr sz="1800" dirty="0">
+                <a:solidFill>
+                  <a:srgbClr val="FFFFFF"/>
+                </a:solidFill>
+                <a:latin typeface="Arial MT"/>
+                <a:cs typeface="Arial MT"/>
+              </a:rPr>
+              <a:t>.</a:t>
+            </a:r>
+            <a:r>
+              <a:rPr sz="1800" spc="-114" dirty="0">
+                <a:solidFill>
+                  <a:srgbClr val="FFFFFF"/>
+                </a:solidFill>
+                <a:latin typeface="Arial MT"/>
+                <a:cs typeface="Arial MT"/>
+              </a:rPr>
+              <a:t> </a:t>
+            </a:r>
+            <a:r>
+              <a:rPr sz="1800" spc="-5" dirty="0">
+                <a:solidFill>
+                  <a:srgbClr val="FFFFFF"/>
+                </a:solidFill>
+                <a:latin typeface="Arial MT"/>
+                <a:cs typeface="Arial MT"/>
+              </a:rPr>
+              <a:t>Acesso</a:t>
+            </a:r>
+            <a:r>
+              <a:rPr sz="1800" spc="10" dirty="0">
+                <a:solidFill>
+                  <a:srgbClr val="FFFFFF"/>
+                </a:solidFill>
+                <a:latin typeface="Arial MT"/>
+                <a:cs typeface="Arial MT"/>
+              </a:rPr>
+              <a:t> </a:t>
+            </a:r>
+            <a:r>
+              <a:rPr sz="1800" spc="-5" dirty="0">
+                <a:solidFill>
+                  <a:srgbClr val="FFFFFF"/>
+                </a:solidFill>
+                <a:latin typeface="Arial MT"/>
+                <a:cs typeface="Arial MT"/>
+              </a:rPr>
+              <a:t>em: 28,</a:t>
+            </a:r>
+            <a:r>
+              <a:rPr sz="1800" spc="5" dirty="0">
+                <a:solidFill>
+                  <a:srgbClr val="FFFFFF"/>
+                </a:solidFill>
+                <a:latin typeface="Arial MT"/>
+                <a:cs typeface="Arial MT"/>
+              </a:rPr>
+              <a:t> </a:t>
+            </a:r>
+            <a:r>
+              <a:rPr sz="1800" spc="-5" dirty="0">
+                <a:solidFill>
+                  <a:srgbClr val="FFFFFF"/>
+                </a:solidFill>
+                <a:latin typeface="Arial MT"/>
+                <a:cs typeface="Arial MT"/>
+              </a:rPr>
+              <a:t>jun</a:t>
+            </a:r>
+            <a:r>
+              <a:rPr sz="1800" spc="10" dirty="0">
+                <a:solidFill>
+                  <a:srgbClr val="FFFFFF"/>
+                </a:solidFill>
+                <a:latin typeface="Arial MT"/>
+                <a:cs typeface="Arial MT"/>
+              </a:rPr>
+              <a:t> </a:t>
+            </a:r>
+            <a:r>
+              <a:rPr sz="1800" spc="-10" dirty="0">
+                <a:solidFill>
+                  <a:srgbClr val="FFFFFF"/>
+                </a:solidFill>
+                <a:latin typeface="Arial MT"/>
+                <a:cs typeface="Arial MT"/>
+              </a:rPr>
+              <a:t>2023.</a:t>
+            </a:r>
+            <a:endParaRPr sz="1800">
+              <a:latin typeface="Arial MT"/>
+              <a:cs typeface="Arial MT"/>
+            </a:endParaRPr>
+          </a:p>
+          <a:p>
+            <a:pPr marL="12700" marR="5080" algn="just">
+              <a:lnSpc>
+                <a:spcPct val="150000"/>
+              </a:lnSpc>
+              <a:spcBef>
+                <a:spcPts val="790"/>
+              </a:spcBef>
+            </a:pPr>
+            <a:r>
+              <a:rPr sz="1800" spc="-10" dirty="0">
+                <a:solidFill>
+                  <a:srgbClr val="FFFFFF"/>
+                </a:solidFill>
+                <a:latin typeface="Arial MT"/>
+                <a:cs typeface="Arial MT"/>
+              </a:rPr>
+              <a:t>AUTOR</a:t>
+            </a:r>
+            <a:r>
+              <a:rPr sz="1800" spc="-5" dirty="0">
+                <a:solidFill>
+                  <a:srgbClr val="FFFFFF"/>
+                </a:solidFill>
+                <a:latin typeface="Arial MT"/>
+                <a:cs typeface="Arial MT"/>
+              </a:rPr>
+              <a:t> DESCONHECIDO</a:t>
+            </a:r>
+            <a:r>
+              <a:rPr sz="1800" b="1" spc="-5" dirty="0">
+                <a:solidFill>
+                  <a:srgbClr val="FFFFFF"/>
+                </a:solidFill>
+                <a:latin typeface="Arial"/>
+                <a:cs typeface="Arial"/>
+              </a:rPr>
+              <a:t>.</a:t>
+            </a:r>
+            <a:r>
+              <a:rPr sz="1800" b="1" dirty="0">
+                <a:solidFill>
+                  <a:srgbClr val="FFFFFF"/>
+                </a:solidFill>
+                <a:latin typeface="Arial"/>
+                <a:cs typeface="Arial"/>
+              </a:rPr>
+              <a:t> </a:t>
+            </a:r>
+            <a:r>
+              <a:rPr sz="1800" b="1" spc="-5" dirty="0">
+                <a:solidFill>
+                  <a:srgbClr val="FFFFFF"/>
+                </a:solidFill>
+                <a:latin typeface="Arial"/>
+                <a:cs typeface="Arial"/>
+              </a:rPr>
+              <a:t>Usando</a:t>
+            </a:r>
+            <a:r>
+              <a:rPr sz="1800" b="1" dirty="0">
+                <a:solidFill>
+                  <a:srgbClr val="FFFFFF"/>
+                </a:solidFill>
+                <a:latin typeface="Arial"/>
+                <a:cs typeface="Arial"/>
+              </a:rPr>
+              <a:t> </a:t>
+            </a:r>
+            <a:r>
+              <a:rPr sz="1800" b="1" spc="-5" dirty="0">
+                <a:solidFill>
+                  <a:srgbClr val="FFFFFF"/>
+                </a:solidFill>
+                <a:latin typeface="Arial"/>
+                <a:cs typeface="Arial"/>
+              </a:rPr>
+              <a:t>scripts</a:t>
+            </a:r>
+            <a:r>
+              <a:rPr sz="1800" b="1" dirty="0">
+                <a:solidFill>
+                  <a:srgbClr val="FFFFFF"/>
+                </a:solidFill>
+                <a:latin typeface="Arial"/>
+                <a:cs typeface="Arial"/>
+              </a:rPr>
+              <a:t> de</a:t>
+            </a:r>
+            <a:r>
+              <a:rPr sz="1800" b="1" spc="5" dirty="0">
+                <a:solidFill>
+                  <a:srgbClr val="FFFFFF"/>
+                </a:solidFill>
+                <a:latin typeface="Arial"/>
+                <a:cs typeface="Arial"/>
+              </a:rPr>
+              <a:t> </a:t>
+            </a:r>
+            <a:r>
+              <a:rPr sz="1800" b="1" spc="-5" dirty="0">
+                <a:solidFill>
+                  <a:srgbClr val="FFFFFF"/>
+                </a:solidFill>
+                <a:latin typeface="Arial"/>
+                <a:cs typeface="Arial"/>
+              </a:rPr>
+              <a:t>exemplo</a:t>
+            </a:r>
+            <a:r>
+              <a:rPr sz="1800" b="1" dirty="0">
+                <a:solidFill>
+                  <a:srgbClr val="FFFFFF"/>
+                </a:solidFill>
+                <a:latin typeface="Arial"/>
+                <a:cs typeface="Arial"/>
+              </a:rPr>
+              <a:t> </a:t>
+            </a:r>
+            <a:r>
+              <a:rPr sz="1800" b="1" spc="-5" dirty="0">
+                <a:solidFill>
+                  <a:srgbClr val="FFFFFF"/>
+                </a:solidFill>
+                <a:latin typeface="Arial"/>
+                <a:cs typeface="Arial"/>
+              </a:rPr>
+              <a:t>para</a:t>
+            </a:r>
+            <a:r>
+              <a:rPr sz="1800" b="1" dirty="0">
+                <a:solidFill>
+                  <a:srgbClr val="FFFFFF"/>
+                </a:solidFill>
+                <a:latin typeface="Arial"/>
+                <a:cs typeface="Arial"/>
+              </a:rPr>
+              <a:t> </a:t>
+            </a:r>
+            <a:r>
+              <a:rPr sz="1800" b="1" spc="-5" dirty="0">
+                <a:solidFill>
+                  <a:srgbClr val="FFFFFF"/>
+                </a:solidFill>
+                <a:latin typeface="Arial"/>
+                <a:cs typeface="Arial"/>
+              </a:rPr>
+              <a:t>criar</a:t>
+            </a:r>
+            <a:r>
+              <a:rPr sz="1800" b="1" dirty="0">
+                <a:solidFill>
+                  <a:srgbClr val="FFFFFF"/>
+                </a:solidFill>
+                <a:latin typeface="Arial"/>
+                <a:cs typeface="Arial"/>
+              </a:rPr>
+              <a:t> </a:t>
+            </a:r>
+            <a:r>
+              <a:rPr sz="1800" b="1" spc="-5" dirty="0">
+                <a:solidFill>
+                  <a:srgbClr val="FFFFFF"/>
+                </a:solidFill>
+                <a:latin typeface="Arial"/>
+                <a:cs typeface="Arial"/>
+              </a:rPr>
+              <a:t>bancos</a:t>
+            </a:r>
+            <a:r>
+              <a:rPr sz="1800" b="1" dirty="0">
+                <a:solidFill>
+                  <a:srgbClr val="FFFFFF"/>
+                </a:solidFill>
+                <a:latin typeface="Arial"/>
+                <a:cs typeface="Arial"/>
+              </a:rPr>
+              <a:t> de</a:t>
+            </a:r>
+            <a:r>
+              <a:rPr sz="1800" b="1" spc="5" dirty="0">
+                <a:solidFill>
+                  <a:srgbClr val="FFFFFF"/>
+                </a:solidFill>
+                <a:latin typeface="Arial"/>
+                <a:cs typeface="Arial"/>
+              </a:rPr>
+              <a:t> </a:t>
+            </a:r>
+            <a:r>
+              <a:rPr sz="1800" b="1" dirty="0">
+                <a:solidFill>
+                  <a:srgbClr val="FFFFFF"/>
+                </a:solidFill>
+                <a:latin typeface="Arial"/>
+                <a:cs typeface="Arial"/>
+              </a:rPr>
+              <a:t>dados</a:t>
+            </a:r>
+            <a:r>
+              <a:rPr sz="1800" b="1" spc="5" dirty="0">
+                <a:solidFill>
+                  <a:srgbClr val="FFFFFF"/>
+                </a:solidFill>
+                <a:latin typeface="Arial"/>
+                <a:cs typeface="Arial"/>
+              </a:rPr>
+              <a:t> </a:t>
+            </a:r>
+            <a:r>
+              <a:rPr sz="1800" b="1" spc="-10" dirty="0">
+                <a:solidFill>
+                  <a:srgbClr val="FFFFFF"/>
+                </a:solidFill>
+                <a:latin typeface="Arial"/>
+                <a:cs typeface="Arial"/>
+              </a:rPr>
+              <a:t>DB2</a:t>
+            </a:r>
+            <a:r>
+              <a:rPr sz="1800" spc="-10" dirty="0">
+                <a:solidFill>
+                  <a:srgbClr val="FFFFFF"/>
+                </a:solidFill>
+                <a:latin typeface="Arial MT"/>
+                <a:cs typeface="Arial MT"/>
+              </a:rPr>
+              <a:t>. </a:t>
+            </a:r>
+            <a:r>
+              <a:rPr sz="1800" spc="-490" dirty="0">
+                <a:solidFill>
+                  <a:srgbClr val="FFFFFF"/>
+                </a:solidFill>
+                <a:latin typeface="Arial MT"/>
+                <a:cs typeface="Arial MT"/>
+              </a:rPr>
+              <a:t> </a:t>
+            </a:r>
+            <a:r>
+              <a:rPr sz="1800" spc="-5" dirty="0">
+                <a:solidFill>
+                  <a:srgbClr val="FFFFFF"/>
+                </a:solidFill>
+                <a:latin typeface="Arial MT"/>
+                <a:cs typeface="Arial MT"/>
+              </a:rPr>
+              <a:t>Disponível</a:t>
+            </a:r>
+            <a:r>
+              <a:rPr sz="1800" dirty="0">
+                <a:solidFill>
+                  <a:srgbClr val="FFFFFF"/>
+                </a:solidFill>
+                <a:latin typeface="Arial MT"/>
+                <a:cs typeface="Arial MT"/>
+              </a:rPr>
+              <a:t> em:</a:t>
+            </a:r>
+            <a:r>
+              <a:rPr sz="1800" spc="5" dirty="0">
+                <a:solidFill>
+                  <a:srgbClr val="FFFFFF"/>
+                </a:solidFill>
+                <a:latin typeface="Arial MT"/>
+                <a:cs typeface="Arial MT"/>
+              </a:rPr>
+              <a:t> </a:t>
+            </a:r>
+            <a:r>
+              <a:rPr sz="1800" spc="-5" dirty="0">
+                <a:solidFill>
+                  <a:srgbClr val="FFFFFF"/>
+                </a:solidFill>
+                <a:latin typeface="Arial MT"/>
+                <a:cs typeface="Arial MT"/>
+              </a:rPr>
+              <a:t>https://</a:t>
+            </a:r>
+            <a:r>
+              <a:rPr sz="1800" spc="-5" dirty="0">
+                <a:solidFill>
+                  <a:srgbClr val="FFFFFF"/>
+                </a:solidFill>
+                <a:latin typeface="Arial MT"/>
+                <a:cs typeface="Arial MT"/>
+                <a:hlinkClick r:id="rId2"/>
+              </a:rPr>
+              <a:t>www.ibm.com/docs/pt-br/control-center/6.1.1?topic=users-using-example- </a:t>
+            </a:r>
+            <a:r>
+              <a:rPr sz="1800" spc="-490" dirty="0">
+                <a:solidFill>
+                  <a:srgbClr val="FFFFFF"/>
+                </a:solidFill>
+                <a:latin typeface="Arial MT"/>
+                <a:cs typeface="Arial MT"/>
+              </a:rPr>
+              <a:t> </a:t>
+            </a:r>
+            <a:r>
+              <a:rPr sz="1800" spc="-5" dirty="0">
+                <a:solidFill>
+                  <a:srgbClr val="FFFFFF"/>
+                </a:solidFill>
+                <a:latin typeface="Arial MT"/>
+                <a:cs typeface="Arial MT"/>
+              </a:rPr>
+              <a:t>scripts-create-db2-databases.</a:t>
+            </a:r>
+            <a:r>
+              <a:rPr sz="1800" spc="-55" dirty="0">
+                <a:solidFill>
+                  <a:srgbClr val="FFFFFF"/>
+                </a:solidFill>
+                <a:latin typeface="Arial MT"/>
+                <a:cs typeface="Arial MT"/>
+              </a:rPr>
+              <a:t> </a:t>
+            </a:r>
+            <a:r>
+              <a:rPr sz="1800" spc="-5" dirty="0">
+                <a:solidFill>
+                  <a:srgbClr val="FFFFFF"/>
+                </a:solidFill>
+                <a:latin typeface="Arial MT"/>
+                <a:cs typeface="Arial MT"/>
+              </a:rPr>
+              <a:t>Acesso em:</a:t>
+            </a:r>
+            <a:r>
+              <a:rPr sz="1800" spc="5" dirty="0">
+                <a:solidFill>
+                  <a:srgbClr val="FFFFFF"/>
+                </a:solidFill>
+                <a:latin typeface="Arial MT"/>
+                <a:cs typeface="Arial MT"/>
+              </a:rPr>
+              <a:t> </a:t>
+            </a:r>
+            <a:r>
+              <a:rPr sz="1800" spc="-5" dirty="0">
+                <a:solidFill>
+                  <a:srgbClr val="FFFFFF"/>
+                </a:solidFill>
+                <a:latin typeface="Arial MT"/>
+                <a:cs typeface="Arial MT"/>
+              </a:rPr>
+              <a:t>22,</a:t>
+            </a:r>
+            <a:r>
+              <a:rPr sz="1800" spc="5" dirty="0">
+                <a:solidFill>
+                  <a:srgbClr val="FFFFFF"/>
+                </a:solidFill>
+                <a:latin typeface="Arial MT"/>
+                <a:cs typeface="Arial MT"/>
+              </a:rPr>
+              <a:t> </a:t>
+            </a:r>
+            <a:r>
+              <a:rPr sz="1800" spc="-5" dirty="0">
+                <a:solidFill>
+                  <a:srgbClr val="FFFFFF"/>
+                </a:solidFill>
+                <a:latin typeface="Arial MT"/>
+                <a:cs typeface="Arial MT"/>
+              </a:rPr>
+              <a:t>jun 2023.</a:t>
+            </a:r>
+            <a:endParaRPr sz="1800">
+              <a:latin typeface="Arial MT"/>
+              <a:cs typeface="Arial MT"/>
+            </a:endParaRPr>
+          </a:p>
+          <a:p>
+            <a:pPr>
+              <a:lnSpc>
+                <a:spcPct val="100000"/>
+              </a:lnSpc>
+              <a:spcBef>
+                <a:spcPts val="45"/>
+              </a:spcBef>
+            </a:pPr>
+            <a:endParaRPr sz="1600">
+              <a:latin typeface="Arial MT"/>
+              <a:cs typeface="Arial MT"/>
+            </a:endParaRPr>
+          </a:p>
+          <a:p>
+            <a:pPr marL="12700" algn="just">
+              <a:lnSpc>
+                <a:spcPct val="100000"/>
+              </a:lnSpc>
+            </a:pPr>
+            <a:r>
+              <a:rPr sz="1800" spc="-5" dirty="0">
+                <a:solidFill>
+                  <a:srgbClr val="FFFFFF"/>
+                </a:solidFill>
+                <a:latin typeface="Arial MT"/>
+                <a:cs typeface="Arial MT"/>
+              </a:rPr>
+              <a:t>ORACLE.</a:t>
+            </a:r>
+            <a:r>
+              <a:rPr sz="1800" spc="540" dirty="0">
+                <a:solidFill>
+                  <a:srgbClr val="FFFFFF"/>
+                </a:solidFill>
+                <a:latin typeface="Arial MT"/>
+                <a:cs typeface="Arial MT"/>
+              </a:rPr>
+              <a:t>    </a:t>
+            </a:r>
+            <a:r>
+              <a:rPr sz="1800" b="1" dirty="0">
+                <a:solidFill>
+                  <a:srgbClr val="FFFFFF"/>
+                </a:solidFill>
+                <a:latin typeface="Arial"/>
+                <a:cs typeface="Arial"/>
+              </a:rPr>
+              <a:t>O       </a:t>
+            </a:r>
+            <a:r>
+              <a:rPr sz="1800" b="1" spc="165" dirty="0">
+                <a:solidFill>
+                  <a:srgbClr val="FFFFFF"/>
+                </a:solidFill>
+                <a:latin typeface="Arial"/>
+                <a:cs typeface="Arial"/>
+              </a:rPr>
+              <a:t> </a:t>
+            </a:r>
+            <a:r>
+              <a:rPr sz="1800" b="1" dirty="0">
+                <a:solidFill>
+                  <a:srgbClr val="FFFFFF"/>
+                </a:solidFill>
+                <a:latin typeface="Arial"/>
+                <a:cs typeface="Arial"/>
+              </a:rPr>
+              <a:t>que       </a:t>
+            </a:r>
+            <a:r>
+              <a:rPr sz="1800" b="1" spc="145" dirty="0">
+                <a:solidFill>
+                  <a:srgbClr val="FFFFFF"/>
+                </a:solidFill>
+                <a:latin typeface="Arial"/>
+                <a:cs typeface="Arial"/>
+              </a:rPr>
+              <a:t> </a:t>
+            </a:r>
+            <a:r>
+              <a:rPr sz="1800" b="1" dirty="0">
+                <a:solidFill>
+                  <a:srgbClr val="FFFFFF"/>
+                </a:solidFill>
+                <a:latin typeface="Arial"/>
+                <a:cs typeface="Arial"/>
+              </a:rPr>
+              <a:t>é       </a:t>
+            </a:r>
+            <a:r>
+              <a:rPr sz="1800" b="1" spc="150" dirty="0">
+                <a:solidFill>
+                  <a:srgbClr val="FFFFFF"/>
+                </a:solidFill>
+                <a:latin typeface="Arial"/>
+                <a:cs typeface="Arial"/>
+              </a:rPr>
+              <a:t> </a:t>
+            </a:r>
+            <a:r>
+              <a:rPr sz="1800" b="1" dirty="0">
+                <a:solidFill>
+                  <a:srgbClr val="FFFFFF"/>
+                </a:solidFill>
+                <a:latin typeface="Arial"/>
+                <a:cs typeface="Arial"/>
+              </a:rPr>
+              <a:t>um       </a:t>
+            </a:r>
+            <a:r>
+              <a:rPr sz="1800" b="1" spc="155" dirty="0">
+                <a:solidFill>
+                  <a:srgbClr val="FFFFFF"/>
+                </a:solidFill>
+                <a:latin typeface="Arial"/>
+                <a:cs typeface="Arial"/>
+              </a:rPr>
+              <a:t> </a:t>
+            </a:r>
+            <a:r>
+              <a:rPr sz="1800" b="1" spc="-5" dirty="0">
+                <a:solidFill>
+                  <a:srgbClr val="FFFFFF"/>
+                </a:solidFill>
+                <a:latin typeface="Arial"/>
+                <a:cs typeface="Arial"/>
+              </a:rPr>
+              <a:t>Banco</a:t>
+            </a:r>
+            <a:r>
+              <a:rPr sz="1800" b="1" spc="540" dirty="0">
+                <a:solidFill>
+                  <a:srgbClr val="FFFFFF"/>
+                </a:solidFill>
+                <a:latin typeface="Arial"/>
+                <a:cs typeface="Arial"/>
+              </a:rPr>
+              <a:t>    </a:t>
+            </a:r>
+            <a:r>
+              <a:rPr sz="1800" b="1" dirty="0">
+                <a:solidFill>
+                  <a:srgbClr val="FFFFFF"/>
+                </a:solidFill>
+                <a:latin typeface="Arial"/>
+                <a:cs typeface="Arial"/>
+              </a:rPr>
+              <a:t>de       </a:t>
+            </a:r>
+            <a:r>
+              <a:rPr sz="1800" b="1" spc="160" dirty="0">
+                <a:solidFill>
+                  <a:srgbClr val="FFFFFF"/>
+                </a:solidFill>
+                <a:latin typeface="Arial"/>
+                <a:cs typeface="Arial"/>
+              </a:rPr>
+              <a:t> </a:t>
+            </a:r>
+            <a:r>
+              <a:rPr sz="1800" b="1" spc="-5" dirty="0">
+                <a:solidFill>
+                  <a:srgbClr val="FFFFFF"/>
+                </a:solidFill>
+                <a:latin typeface="Arial"/>
+                <a:cs typeface="Arial"/>
+              </a:rPr>
+              <a:t>Dados?</a:t>
+            </a:r>
+            <a:r>
+              <a:rPr sz="1800" spc="-5" dirty="0">
+                <a:solidFill>
+                  <a:srgbClr val="FFFFFF"/>
+                </a:solidFill>
+                <a:latin typeface="Arial MT"/>
+                <a:cs typeface="Arial MT"/>
+              </a:rPr>
+              <a:t>.</a:t>
+            </a:r>
+            <a:r>
+              <a:rPr sz="1800" spc="540" dirty="0">
+                <a:solidFill>
+                  <a:srgbClr val="FFFFFF"/>
+                </a:solidFill>
+                <a:latin typeface="Arial MT"/>
+                <a:cs typeface="Arial MT"/>
+              </a:rPr>
+              <a:t>    </a:t>
+            </a:r>
+            <a:r>
+              <a:rPr sz="1800" spc="-5" dirty="0">
+                <a:solidFill>
+                  <a:srgbClr val="FFFFFF"/>
+                </a:solidFill>
+                <a:latin typeface="Arial MT"/>
+                <a:cs typeface="Arial MT"/>
+              </a:rPr>
+              <a:t>Disponível</a:t>
+            </a:r>
+            <a:r>
+              <a:rPr sz="1800" spc="540" dirty="0">
+                <a:solidFill>
+                  <a:srgbClr val="FFFFFF"/>
+                </a:solidFill>
+                <a:latin typeface="Arial MT"/>
+                <a:cs typeface="Arial MT"/>
+              </a:rPr>
+              <a:t>   </a:t>
+            </a:r>
+            <a:r>
+              <a:rPr sz="1800" spc="545" dirty="0">
+                <a:solidFill>
+                  <a:srgbClr val="FFFFFF"/>
+                </a:solidFill>
+                <a:latin typeface="Arial MT"/>
+                <a:cs typeface="Arial MT"/>
+              </a:rPr>
+              <a:t> </a:t>
+            </a:r>
+            <a:r>
+              <a:rPr sz="1800" dirty="0">
+                <a:solidFill>
+                  <a:srgbClr val="FFFFFF"/>
+                </a:solidFill>
+                <a:latin typeface="Arial MT"/>
+                <a:cs typeface="Arial MT"/>
+              </a:rPr>
+              <a:t>em:</a:t>
+            </a:r>
+            <a:endParaRPr sz="1800">
+              <a:latin typeface="Arial MT"/>
+              <a:cs typeface="Arial MT"/>
+            </a:endParaRPr>
+          </a:p>
+          <a:p>
+            <a:pPr marL="12700" algn="just">
+              <a:lnSpc>
+                <a:spcPct val="100000"/>
+              </a:lnSpc>
+              <a:spcBef>
+                <a:spcPts val="1085"/>
+              </a:spcBef>
+            </a:pPr>
+            <a:r>
+              <a:rPr sz="1800" spc="-5" dirty="0">
+                <a:solidFill>
+                  <a:srgbClr val="FFFFFF"/>
+                </a:solidFill>
+                <a:latin typeface="Arial MT"/>
+                <a:cs typeface="Arial MT"/>
+              </a:rPr>
+              <a:t>https://</a:t>
+            </a:r>
+            <a:r>
+              <a:rPr sz="1800" spc="-5" dirty="0">
+                <a:solidFill>
+                  <a:srgbClr val="FFFFFF"/>
+                </a:solidFill>
+                <a:latin typeface="Arial MT"/>
+                <a:cs typeface="Arial MT"/>
+                <a:hlinkClick r:id="rId3"/>
+              </a:rPr>
+              <a:t>www.oracle.com/br/database/what-is-database/.</a:t>
+            </a:r>
+            <a:r>
+              <a:rPr sz="1800" spc="-55" dirty="0">
+                <a:solidFill>
+                  <a:srgbClr val="FFFFFF"/>
+                </a:solidFill>
+                <a:latin typeface="Arial MT"/>
+                <a:cs typeface="Arial MT"/>
+                <a:hlinkClick r:id="rId3"/>
+              </a:rPr>
+              <a:t> </a:t>
+            </a:r>
+            <a:r>
+              <a:rPr sz="1800" spc="-5" dirty="0">
+                <a:solidFill>
+                  <a:srgbClr val="FFFFFF"/>
+                </a:solidFill>
+                <a:latin typeface="Arial MT"/>
+                <a:cs typeface="Arial MT"/>
+              </a:rPr>
+              <a:t>Acesso</a:t>
+            </a:r>
+            <a:r>
+              <a:rPr sz="1800" spc="-10" dirty="0">
+                <a:solidFill>
+                  <a:srgbClr val="FFFFFF"/>
+                </a:solidFill>
+                <a:latin typeface="Arial MT"/>
+                <a:cs typeface="Arial MT"/>
+              </a:rPr>
+              <a:t> </a:t>
+            </a:r>
+            <a:r>
+              <a:rPr sz="1800" spc="-5" dirty="0">
+                <a:solidFill>
+                  <a:srgbClr val="FFFFFF"/>
+                </a:solidFill>
+                <a:latin typeface="Arial MT"/>
+                <a:cs typeface="Arial MT"/>
+              </a:rPr>
+              <a:t>em:</a:t>
+            </a:r>
+            <a:r>
+              <a:rPr sz="1800" dirty="0">
+                <a:solidFill>
+                  <a:srgbClr val="FFFFFF"/>
+                </a:solidFill>
+                <a:latin typeface="Arial MT"/>
+                <a:cs typeface="Arial MT"/>
+              </a:rPr>
+              <a:t> </a:t>
+            </a:r>
+            <a:r>
+              <a:rPr sz="1800" spc="-5" dirty="0">
+                <a:solidFill>
+                  <a:srgbClr val="FFFFFF"/>
+                </a:solidFill>
+                <a:latin typeface="Arial MT"/>
+                <a:cs typeface="Arial MT"/>
+              </a:rPr>
+              <a:t>15,</a:t>
+            </a:r>
+            <a:r>
+              <a:rPr sz="1800" dirty="0">
+                <a:solidFill>
+                  <a:srgbClr val="FFFFFF"/>
+                </a:solidFill>
+                <a:latin typeface="Arial MT"/>
+                <a:cs typeface="Arial MT"/>
+              </a:rPr>
+              <a:t> </a:t>
+            </a:r>
+            <a:r>
+              <a:rPr sz="1800" spc="-5" dirty="0">
+                <a:solidFill>
+                  <a:srgbClr val="FFFFFF"/>
+                </a:solidFill>
+                <a:latin typeface="Arial MT"/>
+                <a:cs typeface="Arial MT"/>
+              </a:rPr>
+              <a:t>jun</a:t>
+            </a:r>
+            <a:r>
+              <a:rPr sz="1800" spc="5" dirty="0">
+                <a:solidFill>
+                  <a:srgbClr val="FFFFFF"/>
+                </a:solidFill>
+                <a:latin typeface="Arial MT"/>
+                <a:cs typeface="Arial MT"/>
+              </a:rPr>
+              <a:t> </a:t>
+            </a:r>
+            <a:r>
+              <a:rPr sz="1800" spc="-5" dirty="0">
+                <a:solidFill>
+                  <a:srgbClr val="FFFFFF"/>
+                </a:solidFill>
+                <a:latin typeface="Arial MT"/>
+                <a:cs typeface="Arial MT"/>
+              </a:rPr>
+              <a:t>2023.</a:t>
+            </a:r>
+            <a:endParaRPr sz="1800">
+              <a:latin typeface="Arial MT"/>
+              <a:cs typeface="Arial MT"/>
+            </a:endParaRPr>
+          </a:p>
+          <a:p>
+            <a:pPr marL="12700" marR="5080" algn="just">
+              <a:lnSpc>
+                <a:spcPct val="150000"/>
+              </a:lnSpc>
+              <a:spcBef>
+                <a:spcPts val="800"/>
+              </a:spcBef>
+            </a:pPr>
+            <a:r>
+              <a:rPr sz="1800" spc="-5" dirty="0">
+                <a:solidFill>
+                  <a:srgbClr val="FFFFFF"/>
+                </a:solidFill>
+                <a:latin typeface="Arial MT"/>
+                <a:cs typeface="Arial MT"/>
+              </a:rPr>
+              <a:t>REZENDE,</a:t>
+            </a:r>
+            <a:r>
+              <a:rPr sz="1800" dirty="0">
+                <a:solidFill>
+                  <a:srgbClr val="FFFFFF"/>
+                </a:solidFill>
+                <a:latin typeface="Arial MT"/>
+                <a:cs typeface="Arial MT"/>
+              </a:rPr>
+              <a:t> </a:t>
+            </a:r>
+            <a:r>
+              <a:rPr sz="1800" spc="-5" dirty="0">
+                <a:solidFill>
+                  <a:srgbClr val="FFFFFF"/>
+                </a:solidFill>
+                <a:latin typeface="Arial MT"/>
+                <a:cs typeface="Arial MT"/>
+              </a:rPr>
+              <a:t>Ricardo.</a:t>
+            </a:r>
+            <a:r>
+              <a:rPr sz="1800" dirty="0">
+                <a:solidFill>
+                  <a:srgbClr val="FFFFFF"/>
+                </a:solidFill>
+                <a:latin typeface="Arial MT"/>
+                <a:cs typeface="Arial MT"/>
+              </a:rPr>
+              <a:t> </a:t>
+            </a:r>
+            <a:r>
+              <a:rPr sz="1800" b="1" dirty="0">
+                <a:solidFill>
+                  <a:srgbClr val="FFFFFF"/>
+                </a:solidFill>
+                <a:latin typeface="Arial"/>
+                <a:cs typeface="Arial"/>
+              </a:rPr>
+              <a:t>Conceitos</a:t>
+            </a:r>
+            <a:r>
+              <a:rPr sz="1800" b="1" spc="5" dirty="0">
+                <a:solidFill>
+                  <a:srgbClr val="FFFFFF"/>
+                </a:solidFill>
+                <a:latin typeface="Arial"/>
+                <a:cs typeface="Arial"/>
+              </a:rPr>
+              <a:t> </a:t>
+            </a:r>
+            <a:r>
+              <a:rPr sz="1800" b="1" spc="-5" dirty="0">
+                <a:solidFill>
+                  <a:srgbClr val="FFFFFF"/>
+                </a:solidFill>
+                <a:latin typeface="Arial"/>
+                <a:cs typeface="Arial"/>
+              </a:rPr>
+              <a:t>Fundamentais</a:t>
+            </a:r>
+            <a:r>
+              <a:rPr sz="1800" b="1" dirty="0">
+                <a:solidFill>
+                  <a:srgbClr val="FFFFFF"/>
+                </a:solidFill>
+                <a:latin typeface="Arial"/>
+                <a:cs typeface="Arial"/>
+              </a:rPr>
+              <a:t> de</a:t>
+            </a:r>
+            <a:r>
+              <a:rPr sz="1800" b="1" spc="5" dirty="0">
+                <a:solidFill>
+                  <a:srgbClr val="FFFFFF"/>
+                </a:solidFill>
+                <a:latin typeface="Arial"/>
+                <a:cs typeface="Arial"/>
+              </a:rPr>
+              <a:t> </a:t>
+            </a:r>
+            <a:r>
+              <a:rPr sz="1800" b="1" spc="-5" dirty="0">
+                <a:solidFill>
+                  <a:srgbClr val="FFFFFF"/>
+                </a:solidFill>
+                <a:latin typeface="Arial"/>
+                <a:cs typeface="Arial"/>
+              </a:rPr>
+              <a:t>Banco</a:t>
+            </a:r>
+            <a:r>
+              <a:rPr sz="1800" b="1" dirty="0">
+                <a:solidFill>
+                  <a:srgbClr val="FFFFFF"/>
+                </a:solidFill>
+                <a:latin typeface="Arial"/>
+                <a:cs typeface="Arial"/>
+              </a:rPr>
+              <a:t> de</a:t>
+            </a:r>
+            <a:r>
+              <a:rPr sz="1800" b="1" spc="5" dirty="0">
+                <a:solidFill>
+                  <a:srgbClr val="FFFFFF"/>
+                </a:solidFill>
+                <a:latin typeface="Arial"/>
+                <a:cs typeface="Arial"/>
+              </a:rPr>
+              <a:t> </a:t>
+            </a:r>
+            <a:r>
+              <a:rPr sz="1800" b="1" spc="-5" dirty="0">
+                <a:solidFill>
+                  <a:srgbClr val="FFFFFF"/>
+                </a:solidFill>
+                <a:latin typeface="Arial"/>
+                <a:cs typeface="Arial"/>
+              </a:rPr>
+              <a:t>Dados</a:t>
+            </a:r>
+            <a:r>
+              <a:rPr sz="1800" spc="-5" dirty="0">
+                <a:solidFill>
+                  <a:srgbClr val="FFFFFF"/>
+                </a:solidFill>
+                <a:latin typeface="Arial MT"/>
+                <a:cs typeface="Arial MT"/>
+              </a:rPr>
+              <a:t>.</a:t>
+            </a:r>
+            <a:r>
+              <a:rPr sz="1800" dirty="0">
+                <a:solidFill>
+                  <a:srgbClr val="FFFFFF"/>
+                </a:solidFill>
+                <a:latin typeface="Arial MT"/>
+                <a:cs typeface="Arial MT"/>
+              </a:rPr>
+              <a:t> </a:t>
+            </a:r>
+            <a:r>
+              <a:rPr sz="1800" spc="-5" dirty="0">
+                <a:solidFill>
+                  <a:srgbClr val="FFFFFF"/>
+                </a:solidFill>
+                <a:latin typeface="Arial MT"/>
+                <a:cs typeface="Arial MT"/>
+              </a:rPr>
+              <a:t>Disponível</a:t>
+            </a:r>
+            <a:r>
+              <a:rPr sz="1800" dirty="0">
+                <a:solidFill>
+                  <a:srgbClr val="FFFFFF"/>
+                </a:solidFill>
+                <a:latin typeface="Arial MT"/>
+                <a:cs typeface="Arial MT"/>
+              </a:rPr>
+              <a:t> </a:t>
+            </a:r>
+            <a:r>
+              <a:rPr sz="1800" spc="-5" dirty="0">
+                <a:solidFill>
+                  <a:srgbClr val="FFFFFF"/>
+                </a:solidFill>
+                <a:latin typeface="Arial MT"/>
+                <a:cs typeface="Arial MT"/>
+              </a:rPr>
+              <a:t>em: </a:t>
+            </a:r>
+            <a:r>
+              <a:rPr sz="1800" dirty="0">
+                <a:solidFill>
+                  <a:srgbClr val="FFFFFF"/>
+                </a:solidFill>
+                <a:latin typeface="Arial MT"/>
+                <a:cs typeface="Arial MT"/>
+              </a:rPr>
+              <a:t> </a:t>
+            </a:r>
+            <a:r>
+              <a:rPr sz="1800" spc="-5" dirty="0">
+                <a:solidFill>
+                  <a:srgbClr val="FFFFFF"/>
+                </a:solidFill>
+                <a:latin typeface="Arial MT"/>
+                <a:cs typeface="Arial MT"/>
+              </a:rPr>
+              <a:t>https://</a:t>
+            </a:r>
+            <a:r>
+              <a:rPr sz="1800" spc="-5" dirty="0">
+                <a:solidFill>
+                  <a:srgbClr val="FFFFFF"/>
+                </a:solidFill>
+                <a:latin typeface="Arial MT"/>
+                <a:cs typeface="Arial MT"/>
+                <a:hlinkClick r:id="rId4"/>
+              </a:rPr>
+              <a:t>www.devmedia.com.br/conceitos-fundamentais-de-banco-de-dados/1649. </a:t>
+            </a:r>
+            <a:r>
+              <a:rPr sz="1800" spc="-5" dirty="0">
+                <a:solidFill>
+                  <a:srgbClr val="FFFFFF"/>
+                </a:solidFill>
+                <a:latin typeface="Arial MT"/>
+                <a:cs typeface="Arial MT"/>
+              </a:rPr>
+              <a:t>Acesso em: </a:t>
+            </a:r>
+            <a:r>
+              <a:rPr sz="1800" spc="-10" dirty="0">
+                <a:solidFill>
+                  <a:srgbClr val="FFFFFF"/>
+                </a:solidFill>
+                <a:latin typeface="Arial MT"/>
+                <a:cs typeface="Arial MT"/>
+              </a:rPr>
+              <a:t>01, </a:t>
+            </a:r>
+            <a:r>
+              <a:rPr sz="1800" spc="-5" dirty="0">
+                <a:solidFill>
+                  <a:srgbClr val="FFFFFF"/>
+                </a:solidFill>
+                <a:latin typeface="Arial MT"/>
+                <a:cs typeface="Arial MT"/>
+              </a:rPr>
+              <a:t>jul </a:t>
+            </a:r>
+            <a:r>
+              <a:rPr sz="1800" dirty="0">
+                <a:solidFill>
+                  <a:srgbClr val="FFFFFF"/>
+                </a:solidFill>
+                <a:latin typeface="Arial MT"/>
+                <a:cs typeface="Arial MT"/>
+              </a:rPr>
+              <a:t> </a:t>
+            </a:r>
+            <a:r>
+              <a:rPr sz="1800" spc="-5" dirty="0">
+                <a:solidFill>
+                  <a:srgbClr val="FFFFFF"/>
+                </a:solidFill>
+                <a:latin typeface="Arial MT"/>
+                <a:cs typeface="Arial MT"/>
+              </a:rPr>
+              <a:t>2023.</a:t>
+            </a:r>
+            <a:endParaRPr sz="1800">
+              <a:latin typeface="Arial MT"/>
+              <a:cs typeface="Arial MT"/>
+            </a:endParaRPr>
+          </a:p>
+        </p:txBody>
+      </p:sp>
+      <p:pic>
+        <p:nvPicPr>
+          <p:cNvPr id="4" name="object 4"/>
+          <p:cNvPicPr/>
+          <p:nvPr/>
+        </p:nvPicPr>
+        <p:blipFill>
+          <a:blip r:embed="rId5" cstate="print"/>
+          <a:stretch>
+            <a:fillRect/>
+          </a:stretch>
+        </p:blipFill>
+        <p:spPr>
+          <a:xfrm>
+            <a:off x="11454383" y="44196"/>
+            <a:ext cx="646176" cy="646176"/>
+          </a:xfrm>
+          <a:prstGeom prst="rect">
+            <a:avLst/>
+          </a:prstGeom>
+        </p:spPr>
+      </p:pic>
+    </p:spTree>
+    <p:extLst>
+      <p:ext uri="{BB962C8B-B14F-4D97-AF65-F5344CB8AC3E}">
+        <p14:creationId xmlns:p14="http://schemas.microsoft.com/office/powerpoint/2010/main" val="620745533"/>
+      </p:ext>
+    </p:extLst>
+  </p:cSld>
+  <p:clrMapOvr>
+    <a:masterClrMapping/>
+  </p:clrMapOvr>
+</p:sld>
+</file>
+
+<file path=ppt/slides/slide15.xml><?xml version="1.0" encoding="utf-8"?>
 <p:sld xmlns:a="http://schemas.openxmlformats.org/drawingml/2006/main" xmlns:r="http://schemas.openxmlformats.org/officeDocument/2006/relationships" xmlns:p="http://schemas.openxmlformats.org/presentationml/2006/main">
   <p:cSld>
     <p:spTree>
@@ -6478,8 +8528,8 @@
         </p:nvSpPr>
         <p:spPr>
           <a:xfrm>
-            <a:off x="3696080" y="572846"/>
-            <a:ext cx="4546600" cy="574675"/>
+            <a:off x="2991038" y="537972"/>
+            <a:ext cx="6209920" cy="566822"/>
           </a:xfrm>
           <a:prstGeom prst="rect">
             <a:avLst/>
@@ -6519,6 +8569,11 @@
               <a:rPr spc="-5" dirty="0"/>
               <a:t>PROJETO</a:t>
             </a:r>
+            <a:r>
+              <a:rPr lang="pt-BR" spc="-5" dirty="0"/>
+              <a:t> (BD1)</a:t>
+            </a:r>
+            <a:endParaRPr spc="-5" dirty="0"/>
           </a:p>
         </p:txBody>
       </p:sp>
@@ -6637,6 +8692,375 @@
         </p:nvSpPr>
         <p:spPr>
           <a:xfrm>
+            <a:off x="4172140" y="644347"/>
+            <a:ext cx="3847720" cy="574675"/>
+          </a:xfrm>
+          <a:prstGeom prst="rect">
+            <a:avLst/>
+          </a:prstGeom>
+        </p:spPr>
+        <p:txBody>
+          <a:bodyPr vert="horz" wrap="square" lIns="0" tIns="12700" rIns="0" bIns="0" rtlCol="0">
+            <a:spAutoFit/>
+          </a:bodyPr>
+          <a:lstStyle/>
+          <a:p>
+            <a:pPr marL="12700">
+              <a:lnSpc>
+                <a:spcPct val="100000"/>
+              </a:lnSpc>
+              <a:spcBef>
+                <a:spcPts val="100"/>
+              </a:spcBef>
+            </a:pPr>
+            <a:r>
+              <a:rPr lang="pt-BR" dirty="0"/>
+              <a:t>INTRODUÇÃO</a:t>
+            </a:r>
+            <a:endParaRPr spc="-5" dirty="0"/>
+          </a:p>
+        </p:txBody>
+      </p:sp>
+      <p:pic>
+        <p:nvPicPr>
+          <p:cNvPr id="3" name="object 3"/>
+          <p:cNvPicPr/>
+          <p:nvPr/>
+        </p:nvPicPr>
+        <p:blipFill>
+          <a:blip r:embed="rId2" cstate="print"/>
+          <a:stretch>
+            <a:fillRect/>
+          </a:stretch>
+        </p:blipFill>
+        <p:spPr>
+          <a:xfrm>
+            <a:off x="11454383" y="44196"/>
+            <a:ext cx="646176" cy="646176"/>
+          </a:xfrm>
+          <a:prstGeom prst="rect">
+            <a:avLst/>
+          </a:prstGeom>
+        </p:spPr>
+      </p:pic>
+      <p:sp>
+        <p:nvSpPr>
+          <p:cNvPr id="5" name="object 5"/>
+          <p:cNvSpPr txBox="1">
+            <a:spLocks noGrp="1"/>
+          </p:cNvSpPr>
+          <p:nvPr>
+            <p:ph type="sldNum" sz="quarter" idx="7"/>
+          </p:nvPr>
+        </p:nvSpPr>
+        <p:spPr>
+          <a:prstGeom prst="rect">
+            <a:avLst/>
+          </a:prstGeom>
+        </p:spPr>
+        <p:txBody>
+          <a:bodyPr vert="horz" wrap="square" lIns="0" tIns="0" rIns="0" bIns="0" rtlCol="0">
+            <a:spAutoFit/>
+          </a:bodyPr>
+          <a:lstStyle/>
+          <a:p>
+            <a:pPr marL="38100">
+              <a:lnSpc>
+                <a:spcPts val="3195"/>
+              </a:lnSpc>
+            </a:pPr>
+            <a:r>
+              <a:rPr lang="pt-BR" spc="-5" dirty="0"/>
+              <a:t>2</a:t>
+            </a:r>
+            <a:endParaRPr spc="-5" dirty="0"/>
+          </a:p>
+        </p:txBody>
+      </p:sp>
+      <p:sp>
+        <p:nvSpPr>
+          <p:cNvPr id="6" name="object 4">
+            <a:extLst>
+              <a:ext uri="{FF2B5EF4-FFF2-40B4-BE49-F238E27FC236}">
+                <a16:creationId xmlns:a16="http://schemas.microsoft.com/office/drawing/2014/main" id="{4BD63BCE-ACBC-B853-2DFF-53098DFC696C}"/>
+              </a:ext>
+            </a:extLst>
+          </p:cNvPr>
+          <p:cNvSpPr txBox="1"/>
+          <p:nvPr/>
+        </p:nvSpPr>
+        <p:spPr>
+          <a:xfrm>
+            <a:off x="1151940" y="1578965"/>
+            <a:ext cx="5007610" cy="3202864"/>
+          </a:xfrm>
+          <a:prstGeom prst="rect">
+            <a:avLst/>
+          </a:prstGeom>
+        </p:spPr>
+        <p:txBody>
+          <a:bodyPr vert="horz" wrap="square" lIns="0" tIns="12700" rIns="0" bIns="0" rtlCol="0">
+            <a:spAutoFit/>
+          </a:bodyPr>
+          <a:lstStyle/>
+          <a:p>
+            <a:pPr marL="354965" marR="5080" indent="-342900" algn="just">
+              <a:lnSpc>
+                <a:spcPct val="150000"/>
+              </a:lnSpc>
+              <a:spcBef>
+                <a:spcPts val="100"/>
+              </a:spcBef>
+              <a:buSzPct val="45000"/>
+              <a:buChar char="•"/>
+              <a:tabLst>
+                <a:tab pos="355600" algn="l"/>
+              </a:tabLst>
+            </a:pPr>
+            <a:r>
+              <a:rPr lang="pt-BR" sz="2000" b="1" dirty="0">
+                <a:solidFill>
+                  <a:srgbClr val="FFFFFF"/>
+                </a:solidFill>
+                <a:latin typeface="Arial MT"/>
+                <a:cs typeface="Arial"/>
+              </a:rPr>
+              <a:t>BreadTrack &gt; </a:t>
+            </a:r>
+            <a:r>
+              <a:rPr lang="pt-BR" sz="2000" dirty="0">
+                <a:solidFill>
+                  <a:srgbClr val="FFFFFF"/>
+                </a:solidFill>
+                <a:latin typeface="Arial MT"/>
+                <a:cs typeface="Arial"/>
+              </a:rPr>
+              <a:t>Gestão de entregas, pedidos, vendas e compras de uma padaria</a:t>
+            </a:r>
+            <a:endParaRPr sz="2000" dirty="0">
+              <a:latin typeface="Arial"/>
+              <a:cs typeface="Arial"/>
+            </a:endParaRPr>
+          </a:p>
+          <a:p>
+            <a:pPr>
+              <a:lnSpc>
+                <a:spcPct val="100000"/>
+              </a:lnSpc>
+              <a:spcBef>
+                <a:spcPts val="35"/>
+              </a:spcBef>
+              <a:buClr>
+                <a:srgbClr val="FFFFFF"/>
+              </a:buClr>
+              <a:buFont typeface="Arial MT"/>
+              <a:buChar char="•"/>
+            </a:pPr>
+            <a:endParaRPr sz="3100" dirty="0">
+              <a:latin typeface="Arial"/>
+              <a:cs typeface="Arial"/>
+            </a:endParaRPr>
+          </a:p>
+          <a:p>
+            <a:pPr marL="354965" marR="5080" indent="-342900" algn="just">
+              <a:lnSpc>
+                <a:spcPct val="150000"/>
+              </a:lnSpc>
+              <a:buSzPct val="45000"/>
+              <a:buChar char="•"/>
+              <a:tabLst>
+                <a:tab pos="355600" algn="l"/>
+              </a:tabLst>
+            </a:pPr>
+            <a:r>
+              <a:rPr sz="2000" dirty="0">
+                <a:solidFill>
+                  <a:srgbClr val="FFFFFF"/>
+                </a:solidFill>
+                <a:latin typeface="Arial MT"/>
+                <a:cs typeface="Arial MT"/>
+              </a:rPr>
+              <a:t>Essa </a:t>
+            </a:r>
+            <a:r>
+              <a:rPr sz="2000" b="1" spc="-5" dirty="0">
+                <a:solidFill>
+                  <a:srgbClr val="FFFFFF"/>
+                </a:solidFill>
+                <a:latin typeface="Arial"/>
+                <a:cs typeface="Arial"/>
+              </a:rPr>
+              <a:t>etapa </a:t>
+            </a:r>
+            <a:r>
+              <a:rPr sz="2000" spc="-10" dirty="0">
+                <a:solidFill>
+                  <a:srgbClr val="FFFFFF"/>
+                </a:solidFill>
+                <a:latin typeface="Arial MT"/>
+                <a:cs typeface="Arial MT"/>
+              </a:rPr>
+              <a:t>foi </a:t>
+            </a:r>
+            <a:r>
+              <a:rPr sz="2000" dirty="0">
+                <a:solidFill>
+                  <a:srgbClr val="FFFFFF"/>
+                </a:solidFill>
+                <a:latin typeface="Arial MT"/>
+                <a:cs typeface="Arial MT"/>
+              </a:rPr>
+              <a:t>a mais </a:t>
+            </a:r>
+            <a:r>
+              <a:rPr sz="2000" b="1" dirty="0">
+                <a:solidFill>
+                  <a:srgbClr val="FFFFFF"/>
+                </a:solidFill>
+                <a:latin typeface="Arial"/>
+                <a:cs typeface="Arial"/>
+              </a:rPr>
+              <a:t>trabalhosa </a:t>
+            </a:r>
+            <a:r>
+              <a:rPr sz="2000" spc="-5" dirty="0">
+                <a:solidFill>
+                  <a:srgbClr val="FFFFFF"/>
+                </a:solidFill>
+                <a:latin typeface="Arial MT"/>
+                <a:cs typeface="Arial MT"/>
+              </a:rPr>
+              <a:t>pois </a:t>
+            </a:r>
+            <a:r>
+              <a:rPr sz="2000" dirty="0">
+                <a:solidFill>
+                  <a:srgbClr val="FFFFFF"/>
+                </a:solidFill>
+                <a:latin typeface="Arial MT"/>
+                <a:cs typeface="Arial MT"/>
+              </a:rPr>
+              <a:t> vários</a:t>
+            </a:r>
+            <a:r>
+              <a:rPr sz="2000" spc="5" dirty="0">
+                <a:solidFill>
+                  <a:srgbClr val="FFFFFF"/>
+                </a:solidFill>
+                <a:latin typeface="Arial MT"/>
+                <a:cs typeface="Arial MT"/>
+              </a:rPr>
+              <a:t> </a:t>
+            </a:r>
+            <a:r>
+              <a:rPr sz="2000" b="1" spc="-5" dirty="0">
+                <a:solidFill>
+                  <a:srgbClr val="FFFFFF"/>
+                </a:solidFill>
+                <a:latin typeface="Arial"/>
+                <a:cs typeface="Arial"/>
+              </a:rPr>
+              <a:t>desafios</a:t>
+            </a:r>
+            <a:r>
+              <a:rPr sz="2000" b="1" dirty="0">
+                <a:solidFill>
+                  <a:srgbClr val="FFFFFF"/>
+                </a:solidFill>
+                <a:latin typeface="Arial"/>
+                <a:cs typeface="Arial"/>
+              </a:rPr>
+              <a:t> </a:t>
+            </a:r>
+            <a:r>
+              <a:rPr sz="2000" dirty="0">
+                <a:solidFill>
+                  <a:srgbClr val="FFFFFF"/>
+                </a:solidFill>
+                <a:latin typeface="Arial MT"/>
+                <a:cs typeface="Arial MT"/>
+              </a:rPr>
+              <a:t>foram surgindo com o </a:t>
+            </a:r>
+            <a:r>
+              <a:rPr sz="2000" spc="5" dirty="0">
+                <a:solidFill>
+                  <a:srgbClr val="FFFFFF"/>
+                </a:solidFill>
+                <a:latin typeface="Arial MT"/>
+                <a:cs typeface="Arial MT"/>
+              </a:rPr>
+              <a:t> </a:t>
+            </a:r>
+            <a:r>
+              <a:rPr sz="2000" b="1" dirty="0">
+                <a:solidFill>
+                  <a:srgbClr val="FFFFFF"/>
+                </a:solidFill>
+                <a:latin typeface="Arial"/>
+                <a:cs typeface="Arial"/>
+              </a:rPr>
+              <a:t>tempo</a:t>
+            </a:r>
+            <a:r>
+              <a:rPr sz="2000" dirty="0">
+                <a:solidFill>
+                  <a:srgbClr val="FFFFFF"/>
+                </a:solidFill>
+                <a:latin typeface="Arial MT"/>
+                <a:cs typeface="Arial MT"/>
+              </a:rPr>
+              <a:t>.</a:t>
+            </a:r>
+            <a:endParaRPr sz="2000" dirty="0">
+              <a:latin typeface="Arial MT"/>
+              <a:cs typeface="Arial MT"/>
+            </a:endParaRPr>
+          </a:p>
+        </p:txBody>
+      </p:sp>
+    </p:spTree>
+    <p:extLst>
+      <p:ext uri="{BB962C8B-B14F-4D97-AF65-F5344CB8AC3E}">
+        <p14:creationId xmlns:p14="http://schemas.microsoft.com/office/powerpoint/2010/main" val="3185472004"/>
+      </p:ext>
+    </p:extLst>
+  </p:cSld>
+  <p:clrMapOvr>
+    <a:masterClrMapping/>
+  </p:clrMapOvr>
+</p:sld>
+</file>
+
+<file path=ppt/slides/slide5.xml><?xml version="1.0" encoding="utf-8"?>
+<p:sld xmlns:a="http://schemas.openxmlformats.org/drawingml/2006/main" xmlns:r="http://schemas.openxmlformats.org/officeDocument/2006/relationships" xmlns:p="http://schemas.openxmlformats.org/presentationml/2006/main">
+  <p:cSld>
+    <p:spTree>
+      <p:nvGrpSpPr>
+        <p:cNvPr id="1" name=""/>
+        <p:cNvGrpSpPr/>
+        <p:nvPr/>
+      </p:nvGrpSpPr>
+      <p:grpSpPr>
+        <a:xfrm>
+          <a:off x="0" y="0"/>
+          <a:ext cx="0" cy="0"/>
+          <a:chOff x="0" y="0"/>
+          <a:chExt cx="0" cy="0"/>
+        </a:xfrm>
+      </p:grpSpPr>
+      <p:sp>
+        <p:nvSpPr>
+          <p:cNvPr id="2" name="object 2"/>
+          <p:cNvSpPr txBox="1">
+            <a:spLocks noGrp="1"/>
+          </p:cNvSpPr>
+          <p:nvPr>
+            <p:ph type="title"/>
+          </p:nvPr>
+        </p:nvSpPr>
+        <p:spPr>
+          <a:xfrm>
             <a:off x="4468495" y="572846"/>
             <a:ext cx="3048635" cy="574675"/>
           </a:xfrm>
@@ -7249,7 +9673,7 @@
               </a:rPr>
               <a:t>.</a:t>
             </a:r>
-            <a:endParaRPr sz="2000">
+            <a:endParaRPr sz="2000" dirty="0">
               <a:latin typeface="Arial"/>
               <a:cs typeface="Arial"/>
             </a:endParaRPr>
@@ -7268,7 +9692,7 @@
               <a:buFont typeface="Arial MT"/>
               <a:buChar char="•"/>
             </a:pPr>
-            <a:endParaRPr sz="3100">
+            <a:endParaRPr sz="3100" dirty="0">
               <a:latin typeface="Arial"/>
               <a:cs typeface="Arial"/>
             </a:endParaRPr>
@@ -7424,7 +9848,7 @@
               </a:rPr>
               <a:t>.</a:t>
             </a:r>
-            <a:endParaRPr sz="2000">
+            <a:endParaRPr sz="2000" dirty="0">
               <a:latin typeface="Arial MT"/>
               <a:cs typeface="Arial MT"/>
             </a:endParaRPr>
@@ -7561,7 +9985,7 @@
 </p:sld>
 </file>
 
-<file path=ppt/slides/slide5.xml><?xml version="1.0" encoding="utf-8"?>
+<file path=ppt/slides/slide6.xml><?xml version="1.0" encoding="utf-8"?>
 <p:sld xmlns:a="http://schemas.openxmlformats.org/drawingml/2006/main" xmlns:r="http://schemas.openxmlformats.org/officeDocument/2006/relationships" xmlns:p="http://schemas.openxmlformats.org/presentationml/2006/main">
   <p:cSld>
     <p:spTree>
@@ -8586,7 +11010,7 @@
 </p:sld>
 </file>
 
-<file path=ppt/slides/slide6.xml><?xml version="1.0" encoding="utf-8"?>
+<file path=ppt/slides/slide7.xml><?xml version="1.0" encoding="utf-8"?>
 <p:sld xmlns:a="http://schemas.openxmlformats.org/drawingml/2006/main" xmlns:r="http://schemas.openxmlformats.org/officeDocument/2006/relationships" xmlns:p="http://schemas.openxmlformats.org/presentationml/2006/main">
   <p:cSld>
     <p:spTree>
@@ -9187,7 +11611,7 @@
 </p:sld>
 </file>
 
-<file path=ppt/slides/slide7.xml><?xml version="1.0" encoding="utf-8"?>
+<file path=ppt/slides/slide8.xml><?xml version="1.0" encoding="utf-8"?>
 <p:sld xmlns:a="http://schemas.openxmlformats.org/drawingml/2006/main" xmlns:r="http://schemas.openxmlformats.org/officeDocument/2006/relationships" xmlns:p="http://schemas.openxmlformats.org/presentationml/2006/main">
   <p:cSld>
     <p:spTree>
@@ -9396,7 +11820,7 @@
 </p:sld>
 </file>
 
-<file path=ppt/slides/slide8.xml><?xml version="1.0" encoding="utf-8"?>
+<file path=ppt/slides/slide9.xml><?xml version="1.0" encoding="utf-8"?>
 <p:sld xmlns:a="http://schemas.openxmlformats.org/drawingml/2006/main" xmlns:r="http://schemas.openxmlformats.org/officeDocument/2006/relationships" xmlns:p="http://schemas.openxmlformats.org/presentationml/2006/main">
   <p:cSld>
     <p:spTree>
@@ -10108,838 +12532,6 @@
                 <a:cs typeface="Courier New"/>
               </a:rPr>
               <a:t>ascendente;</a:t>
-            </a:r>
-            <a:endParaRPr sz="1800">
-              <a:latin typeface="Courier New"/>
-              <a:cs typeface="Courier New"/>
-            </a:endParaRPr>
-          </a:p>
-        </p:txBody>
-      </p:sp>
-    </p:spTree>
-  </p:cSld>
-  <p:clrMapOvr>
-    <a:masterClrMapping/>
-  </p:clrMapOvr>
-</p:sld>
-</file>
-
-<file path=ppt/slides/slide9.xml><?xml version="1.0" encoding="utf-8"?>
-<p:sld xmlns:a="http://schemas.openxmlformats.org/drawingml/2006/main" xmlns:r="http://schemas.openxmlformats.org/officeDocument/2006/relationships" xmlns:p="http://schemas.openxmlformats.org/presentationml/2006/main">
-  <p:cSld>
-    <p:spTree>
-      <p:nvGrpSpPr>
-        <p:cNvPr id="1" name=""/>
-        <p:cNvGrpSpPr/>
-        <p:nvPr/>
-      </p:nvGrpSpPr>
-      <p:grpSpPr>
-        <a:xfrm>
-          <a:off x="0" y="0"/>
-          <a:ext cx="0" cy="0"/>
-          <a:chOff x="0" y="0"/>
-          <a:chExt cx="0" cy="0"/>
-        </a:xfrm>
-      </p:grpSpPr>
-      <p:sp>
-        <p:nvSpPr>
-          <p:cNvPr id="2" name="object 2"/>
-          <p:cNvSpPr txBox="1">
-            <a:spLocks noGrp="1"/>
-          </p:cNvSpPr>
-          <p:nvPr>
-            <p:ph type="title"/>
-          </p:nvPr>
-        </p:nvSpPr>
-        <p:spPr>
-          <a:xfrm>
-            <a:off x="4503801" y="572846"/>
-            <a:ext cx="3023235" cy="574675"/>
-          </a:xfrm>
-          <a:prstGeom prst="rect">
-            <a:avLst/>
-          </a:prstGeom>
-        </p:spPr>
-        <p:txBody>
-          <a:bodyPr vert="horz" wrap="square" lIns="0" tIns="12700" rIns="0" bIns="0" rtlCol="0">
-            <a:spAutoFit/>
-          </a:bodyPr>
-          <a:lstStyle/>
-          <a:p>
-            <a:pPr marL="12700">
-              <a:lnSpc>
-                <a:spcPct val="100000"/>
-              </a:lnSpc>
-              <a:spcBef>
-                <a:spcPts val="100"/>
-              </a:spcBef>
-            </a:pPr>
-            <a:r>
-              <a:rPr dirty="0"/>
-              <a:t>RELAT</a:t>
-            </a:r>
-            <a:r>
-              <a:rPr spc="-15" dirty="0"/>
-              <a:t>Ó</a:t>
-            </a:r>
-            <a:r>
-              <a:rPr dirty="0"/>
-              <a:t>RIOS</a:t>
-            </a:r>
-          </a:p>
-        </p:txBody>
-      </p:sp>
-      <p:pic>
-        <p:nvPicPr>
-          <p:cNvPr id="3" name="object 3"/>
-          <p:cNvPicPr/>
-          <p:nvPr/>
-        </p:nvPicPr>
-        <p:blipFill>
-          <a:blip r:embed="rId2" cstate="print"/>
-          <a:stretch>
-            <a:fillRect/>
-          </a:stretch>
-        </p:blipFill>
-        <p:spPr>
-          <a:xfrm>
-            <a:off x="11454383" y="44196"/>
-            <a:ext cx="646176" cy="646176"/>
-          </a:xfrm>
-          <a:prstGeom prst="rect">
-            <a:avLst/>
-          </a:prstGeom>
-        </p:spPr>
-      </p:pic>
-      <p:grpSp>
-        <p:nvGrpSpPr>
-          <p:cNvPr id="4" name="object 4"/>
-          <p:cNvGrpSpPr/>
-          <p:nvPr/>
-        </p:nvGrpSpPr>
-        <p:grpSpPr>
-          <a:xfrm>
-            <a:off x="1776476" y="1425955"/>
-            <a:ext cx="3090545" cy="2357120"/>
-            <a:chOff x="1776476" y="1425955"/>
-            <a:chExt cx="3090545" cy="2357120"/>
-          </a:xfrm>
-        </p:grpSpPr>
-        <p:pic>
-          <p:nvPicPr>
-            <p:cNvPr id="5" name="object 5"/>
-            <p:cNvPicPr/>
-            <p:nvPr/>
-          </p:nvPicPr>
-          <p:blipFill>
-            <a:blip r:embed="rId3" cstate="print"/>
-            <a:stretch>
-              <a:fillRect/>
-            </a:stretch>
-          </p:blipFill>
-          <p:spPr>
-            <a:xfrm>
-              <a:off x="1789176" y="1438655"/>
-              <a:ext cx="3064764" cy="2331720"/>
-            </a:xfrm>
-            <a:prstGeom prst="rect">
-              <a:avLst/>
-            </a:prstGeom>
-          </p:spPr>
-        </p:pic>
-        <p:sp>
-          <p:nvSpPr>
-            <p:cNvPr id="6" name="object 6"/>
-            <p:cNvSpPr/>
-            <p:nvPr/>
-          </p:nvSpPr>
-          <p:spPr>
-            <a:xfrm>
-              <a:off x="1782826" y="1432305"/>
-              <a:ext cx="3077845" cy="2344420"/>
-            </a:xfrm>
-            <a:custGeom>
-              <a:avLst/>
-              <a:gdLst/>
-              <a:ahLst/>
-              <a:cxnLst/>
-              <a:rect l="l" t="t" r="r" b="b"/>
-              <a:pathLst>
-                <a:path w="3077845" h="2344420">
-                  <a:moveTo>
-                    <a:pt x="0" y="2344420"/>
-                  </a:moveTo>
-                  <a:lnTo>
-                    <a:pt x="3077464" y="2344420"/>
-                  </a:lnTo>
-                  <a:lnTo>
-                    <a:pt x="3077464" y="0"/>
-                  </a:lnTo>
-                  <a:lnTo>
-                    <a:pt x="0" y="0"/>
-                  </a:lnTo>
-                  <a:lnTo>
-                    <a:pt x="0" y="2344420"/>
-                  </a:lnTo>
-                  <a:close/>
-                </a:path>
-              </a:pathLst>
-            </a:custGeom>
-            <a:ln w="12699">
-              <a:solidFill>
-                <a:srgbClr val="FFFFFF"/>
-              </a:solidFill>
-            </a:ln>
-          </p:spPr>
-          <p:txBody>
-            <a:bodyPr wrap="square" lIns="0" tIns="0" rIns="0" bIns="0" rtlCol="0"/>
-            <a:lstStyle/>
-            <a:p>
-              <a:endParaRPr/>
-            </a:p>
-          </p:txBody>
-        </p:sp>
-      </p:grpSp>
-      <p:grpSp>
-        <p:nvGrpSpPr>
-          <p:cNvPr id="7" name="object 7"/>
-          <p:cNvGrpSpPr/>
-          <p:nvPr/>
-        </p:nvGrpSpPr>
-        <p:grpSpPr>
-          <a:xfrm>
-            <a:off x="1235455" y="3996944"/>
-            <a:ext cx="4173854" cy="2263140"/>
-            <a:chOff x="1235455" y="3996944"/>
-            <a:chExt cx="4173854" cy="2263140"/>
-          </a:xfrm>
-        </p:grpSpPr>
-        <p:pic>
-          <p:nvPicPr>
-            <p:cNvPr id="8" name="object 8"/>
-            <p:cNvPicPr/>
-            <p:nvPr/>
-          </p:nvPicPr>
-          <p:blipFill>
-            <a:blip r:embed="rId4" cstate="print"/>
-            <a:stretch>
-              <a:fillRect/>
-            </a:stretch>
-          </p:blipFill>
-          <p:spPr>
-            <a:xfrm>
-              <a:off x="1248155" y="4009644"/>
-              <a:ext cx="4148328" cy="2237232"/>
-            </a:xfrm>
-            <a:prstGeom prst="rect">
-              <a:avLst/>
-            </a:prstGeom>
-          </p:spPr>
-        </p:pic>
-        <p:sp>
-          <p:nvSpPr>
-            <p:cNvPr id="9" name="object 9"/>
-            <p:cNvSpPr/>
-            <p:nvPr/>
-          </p:nvSpPr>
-          <p:spPr>
-            <a:xfrm>
-              <a:off x="1241805" y="4003294"/>
-              <a:ext cx="4161154" cy="2250440"/>
-            </a:xfrm>
-            <a:custGeom>
-              <a:avLst/>
-              <a:gdLst/>
-              <a:ahLst/>
-              <a:cxnLst/>
-              <a:rect l="l" t="t" r="r" b="b"/>
-              <a:pathLst>
-                <a:path w="4161154" h="2250440">
-                  <a:moveTo>
-                    <a:pt x="0" y="2249931"/>
-                  </a:moveTo>
-                  <a:lnTo>
-                    <a:pt x="4161028" y="2249931"/>
-                  </a:lnTo>
-                  <a:lnTo>
-                    <a:pt x="4161028" y="0"/>
-                  </a:lnTo>
-                  <a:lnTo>
-                    <a:pt x="0" y="0"/>
-                  </a:lnTo>
-                  <a:lnTo>
-                    <a:pt x="0" y="2249931"/>
-                  </a:lnTo>
-                  <a:close/>
-                </a:path>
-              </a:pathLst>
-            </a:custGeom>
-            <a:ln w="12700">
-              <a:solidFill>
-                <a:srgbClr val="FFFFFF"/>
-              </a:solidFill>
-            </a:ln>
-          </p:spPr>
-          <p:txBody>
-            <a:bodyPr wrap="square" lIns="0" tIns="0" rIns="0" bIns="0" rtlCol="0"/>
-            <a:lstStyle/>
-            <a:p>
-              <a:endParaRPr/>
-            </a:p>
-          </p:txBody>
-        </p:sp>
-      </p:grpSp>
-      <p:sp>
-        <p:nvSpPr>
-          <p:cNvPr id="10" name="object 10"/>
-          <p:cNvSpPr txBox="1"/>
-          <p:nvPr/>
-        </p:nvSpPr>
-        <p:spPr>
-          <a:xfrm>
-            <a:off x="6299072" y="1669491"/>
-            <a:ext cx="4396105" cy="574675"/>
-          </a:xfrm>
-          <a:prstGeom prst="rect">
-            <a:avLst/>
-          </a:prstGeom>
-        </p:spPr>
-        <p:txBody>
-          <a:bodyPr vert="horz" wrap="square" lIns="0" tIns="12700" rIns="0" bIns="0" rtlCol="0">
-            <a:spAutoFit/>
-          </a:bodyPr>
-          <a:lstStyle/>
-          <a:p>
-            <a:pPr marL="12700">
-              <a:lnSpc>
-                <a:spcPct val="100000"/>
-              </a:lnSpc>
-              <a:spcBef>
-                <a:spcPts val="100"/>
-              </a:spcBef>
-            </a:pPr>
-            <a:r>
-              <a:rPr sz="1800" spc="-5" dirty="0">
-                <a:solidFill>
-                  <a:srgbClr val="669668"/>
-                </a:solidFill>
-                <a:latin typeface="Courier New"/>
-                <a:cs typeface="Courier New"/>
-              </a:rPr>
-              <a:t>--3)</a:t>
-            </a:r>
-            <a:r>
-              <a:rPr sz="1800" spc="-25" dirty="0">
-                <a:solidFill>
-                  <a:srgbClr val="669668"/>
-                </a:solidFill>
-                <a:latin typeface="Courier New"/>
-                <a:cs typeface="Courier New"/>
-              </a:rPr>
-              <a:t> </a:t>
-            </a:r>
-            <a:r>
-              <a:rPr sz="1800" spc="-10" dirty="0">
-                <a:solidFill>
-                  <a:srgbClr val="669668"/>
-                </a:solidFill>
-                <a:latin typeface="Courier New"/>
-                <a:cs typeface="Courier New"/>
-              </a:rPr>
-              <a:t>Relação dos</a:t>
-            </a:r>
-            <a:r>
-              <a:rPr sz="1800" spc="-25" dirty="0">
-                <a:solidFill>
-                  <a:srgbClr val="669668"/>
-                </a:solidFill>
-                <a:latin typeface="Courier New"/>
-                <a:cs typeface="Courier New"/>
-              </a:rPr>
-              <a:t> </a:t>
-            </a:r>
-            <a:r>
-              <a:rPr sz="1800" spc="-10" dirty="0">
-                <a:solidFill>
-                  <a:srgbClr val="669668"/>
-                </a:solidFill>
-                <a:latin typeface="Courier New"/>
-                <a:cs typeface="Courier New"/>
-              </a:rPr>
-              <a:t>top</a:t>
-            </a:r>
-            <a:r>
-              <a:rPr sz="1800" spc="-25" dirty="0">
-                <a:solidFill>
-                  <a:srgbClr val="669668"/>
-                </a:solidFill>
-                <a:latin typeface="Courier New"/>
-                <a:cs typeface="Courier New"/>
-              </a:rPr>
-              <a:t> </a:t>
-            </a:r>
-            <a:r>
-              <a:rPr sz="1800" spc="-10" dirty="0">
-                <a:solidFill>
-                  <a:srgbClr val="669668"/>
-                </a:solidFill>
-                <a:latin typeface="Courier New"/>
-                <a:cs typeface="Courier New"/>
-              </a:rPr>
-              <a:t>10</a:t>
-            </a:r>
-            <a:r>
-              <a:rPr sz="1800" spc="-5" dirty="0">
-                <a:solidFill>
-                  <a:srgbClr val="669668"/>
-                </a:solidFill>
-                <a:latin typeface="Courier New"/>
-                <a:cs typeface="Courier New"/>
-              </a:rPr>
-              <a:t> </a:t>
-            </a:r>
-            <a:r>
-              <a:rPr sz="1800" spc="-10" dirty="0">
-                <a:solidFill>
-                  <a:srgbClr val="669668"/>
-                </a:solidFill>
-                <a:latin typeface="Courier New"/>
-                <a:cs typeface="Courier New"/>
-              </a:rPr>
-              <a:t>produtos</a:t>
-            </a:r>
-            <a:endParaRPr sz="1800">
-              <a:latin typeface="Courier New"/>
-              <a:cs typeface="Courier New"/>
-            </a:endParaRPr>
-          </a:p>
-          <a:p>
-            <a:pPr marL="12700">
-              <a:lnSpc>
-                <a:spcPct val="100000"/>
-              </a:lnSpc>
-              <a:spcBef>
-                <a:spcPts val="5"/>
-              </a:spcBef>
-            </a:pPr>
-            <a:r>
-              <a:rPr sz="1800" spc="-10" dirty="0">
-                <a:solidFill>
-                  <a:srgbClr val="669668"/>
-                </a:solidFill>
-                <a:latin typeface="Courier New"/>
-                <a:cs typeface="Courier New"/>
-              </a:rPr>
-              <a:t>vendidos</a:t>
-            </a:r>
-            <a:r>
-              <a:rPr sz="1800" spc="-40" dirty="0">
-                <a:solidFill>
-                  <a:srgbClr val="669668"/>
-                </a:solidFill>
-                <a:latin typeface="Courier New"/>
-                <a:cs typeface="Courier New"/>
-              </a:rPr>
-              <a:t> </a:t>
-            </a:r>
-            <a:r>
-              <a:rPr sz="1800" spc="-10" dirty="0">
-                <a:solidFill>
-                  <a:srgbClr val="669668"/>
-                </a:solidFill>
-                <a:latin typeface="Courier New"/>
-                <a:cs typeface="Courier New"/>
-              </a:rPr>
-              <a:t>em</a:t>
-            </a:r>
-            <a:r>
-              <a:rPr sz="1800" spc="-40" dirty="0">
-                <a:solidFill>
-                  <a:srgbClr val="669668"/>
-                </a:solidFill>
-                <a:latin typeface="Courier New"/>
-                <a:cs typeface="Courier New"/>
-              </a:rPr>
-              <a:t> </a:t>
-            </a:r>
-            <a:r>
-              <a:rPr sz="1800" spc="-10" dirty="0">
-                <a:solidFill>
-                  <a:srgbClr val="669668"/>
-                </a:solidFill>
-                <a:latin typeface="Courier New"/>
-                <a:cs typeface="Courier New"/>
-              </a:rPr>
-              <a:t>2023;</a:t>
-            </a:r>
-            <a:endParaRPr sz="1800">
-              <a:latin typeface="Courier New"/>
-              <a:cs typeface="Courier New"/>
-            </a:endParaRPr>
-          </a:p>
-        </p:txBody>
-      </p:sp>
-      <p:sp>
-        <p:nvSpPr>
-          <p:cNvPr id="12" name="object 12"/>
-          <p:cNvSpPr txBox="1">
-            <a:spLocks noGrp="1"/>
-          </p:cNvSpPr>
-          <p:nvPr>
-            <p:ph type="sldNum" sz="quarter" idx="7"/>
-          </p:nvPr>
-        </p:nvSpPr>
-        <p:spPr>
-          <a:prstGeom prst="rect">
-            <a:avLst/>
-          </a:prstGeom>
-        </p:spPr>
-        <p:txBody>
-          <a:bodyPr vert="horz" wrap="square" lIns="0" tIns="0" rIns="0" bIns="0" rtlCol="0">
-            <a:spAutoFit/>
-          </a:bodyPr>
-          <a:lstStyle/>
-          <a:p>
-            <a:pPr marL="38100">
-              <a:lnSpc>
-                <a:spcPts val="3195"/>
-              </a:lnSpc>
-            </a:pPr>
-            <a:r>
-              <a:rPr spc="-5" dirty="0"/>
-              <a:t>12</a:t>
-            </a:r>
-          </a:p>
-        </p:txBody>
-      </p:sp>
-      <p:sp>
-        <p:nvSpPr>
-          <p:cNvPr id="11" name="object 11"/>
-          <p:cNvSpPr txBox="1"/>
-          <p:nvPr/>
-        </p:nvSpPr>
-        <p:spPr>
-          <a:xfrm>
-            <a:off x="6299072" y="4016502"/>
-            <a:ext cx="4939665" cy="1946275"/>
-          </a:xfrm>
-          <a:prstGeom prst="rect">
-            <a:avLst/>
-          </a:prstGeom>
-        </p:spPr>
-        <p:txBody>
-          <a:bodyPr vert="horz" wrap="square" lIns="0" tIns="12700" rIns="0" bIns="0" rtlCol="0">
-            <a:spAutoFit/>
-          </a:bodyPr>
-          <a:lstStyle/>
-          <a:p>
-            <a:pPr marL="12700" marR="5080">
-              <a:lnSpc>
-                <a:spcPct val="100000"/>
-              </a:lnSpc>
-              <a:spcBef>
-                <a:spcPts val="100"/>
-              </a:spcBef>
-            </a:pPr>
-            <a:r>
-              <a:rPr sz="1800" spc="-10" dirty="0">
-                <a:solidFill>
-                  <a:srgbClr val="669668"/>
-                </a:solidFill>
-                <a:latin typeface="Courier New"/>
-                <a:cs typeface="Courier New"/>
-              </a:rPr>
-              <a:t>--4) Relação de meses, quantidade </a:t>
-            </a:r>
-            <a:r>
-              <a:rPr sz="1800" spc="-5" dirty="0">
-                <a:solidFill>
-                  <a:srgbClr val="669668"/>
-                </a:solidFill>
-                <a:latin typeface="Courier New"/>
-                <a:cs typeface="Courier New"/>
-              </a:rPr>
-              <a:t> </a:t>
-            </a:r>
-            <a:r>
-              <a:rPr sz="1800" spc="-10" dirty="0">
-                <a:solidFill>
-                  <a:srgbClr val="669668"/>
-                </a:solidFill>
-                <a:latin typeface="Courier New"/>
-                <a:cs typeface="Courier New"/>
-              </a:rPr>
-              <a:t>total </a:t>
-            </a:r>
-            <a:r>
-              <a:rPr sz="1800" spc="-5" dirty="0">
-                <a:solidFill>
-                  <a:srgbClr val="669668"/>
-                </a:solidFill>
-                <a:latin typeface="Courier New"/>
-                <a:cs typeface="Courier New"/>
-              </a:rPr>
-              <a:t>de </a:t>
-            </a:r>
-            <a:r>
-              <a:rPr sz="1800" spc="-10" dirty="0">
-                <a:solidFill>
-                  <a:srgbClr val="669668"/>
-                </a:solidFill>
-                <a:latin typeface="Courier New"/>
-                <a:cs typeface="Courier New"/>
-              </a:rPr>
-              <a:t>vendas, valor total de </a:t>
-            </a:r>
-            <a:r>
-              <a:rPr sz="1800" spc="-5" dirty="0">
-                <a:solidFill>
-                  <a:srgbClr val="669668"/>
-                </a:solidFill>
-                <a:latin typeface="Courier New"/>
-                <a:cs typeface="Courier New"/>
-              </a:rPr>
-              <a:t> </a:t>
-            </a:r>
-            <a:r>
-              <a:rPr sz="1800" spc="-10" dirty="0">
-                <a:solidFill>
-                  <a:srgbClr val="669668"/>
-                </a:solidFill>
-                <a:latin typeface="Courier New"/>
-                <a:cs typeface="Courier New"/>
-              </a:rPr>
-              <a:t>vendas por mês. Relacionar somente </a:t>
-            </a:r>
-            <a:r>
-              <a:rPr sz="1800" spc="-5" dirty="0">
-                <a:solidFill>
-                  <a:srgbClr val="669668"/>
-                </a:solidFill>
-                <a:latin typeface="Courier New"/>
-                <a:cs typeface="Courier New"/>
-              </a:rPr>
-              <a:t> </a:t>
-            </a:r>
-            <a:r>
-              <a:rPr sz="1800" spc="-10" dirty="0">
-                <a:solidFill>
-                  <a:srgbClr val="669668"/>
-                </a:solidFill>
-                <a:latin typeface="Courier New"/>
-                <a:cs typeface="Courier New"/>
-              </a:rPr>
-              <a:t>meses com quantidade de vendas acima </a:t>
-            </a:r>
-            <a:r>
-              <a:rPr sz="1800" spc="-1070" dirty="0">
-                <a:solidFill>
-                  <a:srgbClr val="669668"/>
-                </a:solidFill>
-                <a:latin typeface="Courier New"/>
-                <a:cs typeface="Courier New"/>
-              </a:rPr>
-              <a:t> </a:t>
-            </a:r>
-            <a:r>
-              <a:rPr sz="1800" spc="-5" dirty="0">
-                <a:solidFill>
-                  <a:srgbClr val="669668"/>
-                </a:solidFill>
-                <a:latin typeface="Courier New"/>
-                <a:cs typeface="Courier New"/>
-              </a:rPr>
-              <a:t>de </a:t>
-            </a:r>
-            <a:r>
-              <a:rPr sz="1800" spc="-10" dirty="0">
-                <a:solidFill>
-                  <a:srgbClr val="669668"/>
-                </a:solidFill>
-                <a:latin typeface="Courier New"/>
-                <a:cs typeface="Courier New"/>
-              </a:rPr>
-              <a:t>100. Ordenar </a:t>
-            </a:r>
-            <a:r>
-              <a:rPr sz="1800" dirty="0">
-                <a:solidFill>
-                  <a:srgbClr val="669668"/>
-                </a:solidFill>
-                <a:latin typeface="Courier New"/>
-                <a:cs typeface="Courier New"/>
-              </a:rPr>
-              <a:t>o </a:t>
-            </a:r>
-            <a:r>
-              <a:rPr sz="1800" spc="-10" dirty="0">
-                <a:solidFill>
-                  <a:srgbClr val="669668"/>
-                </a:solidFill>
-                <a:latin typeface="Courier New"/>
-                <a:cs typeface="Courier New"/>
-              </a:rPr>
-              <a:t>relatório </a:t>
-            </a:r>
-            <a:r>
-              <a:rPr sz="1800" spc="-5" dirty="0">
-                <a:solidFill>
-                  <a:srgbClr val="669668"/>
-                </a:solidFill>
-                <a:latin typeface="Courier New"/>
-                <a:cs typeface="Courier New"/>
-              </a:rPr>
-              <a:t>do </a:t>
-            </a:r>
-            <a:r>
-              <a:rPr sz="1800" spc="-10" dirty="0">
-                <a:solidFill>
-                  <a:srgbClr val="669668"/>
-                </a:solidFill>
-                <a:latin typeface="Courier New"/>
-                <a:cs typeface="Courier New"/>
-              </a:rPr>
-              <a:t>mês </a:t>
-            </a:r>
-            <a:r>
-              <a:rPr sz="1800" spc="-5" dirty="0">
-                <a:solidFill>
-                  <a:srgbClr val="669668"/>
-                </a:solidFill>
-                <a:latin typeface="Courier New"/>
-                <a:cs typeface="Courier New"/>
-              </a:rPr>
-              <a:t> com </a:t>
-            </a:r>
-            <a:r>
-              <a:rPr sz="1800" dirty="0">
-                <a:solidFill>
-                  <a:srgbClr val="669668"/>
-                </a:solidFill>
-                <a:latin typeface="Courier New"/>
-                <a:cs typeface="Courier New"/>
-              </a:rPr>
-              <a:t>o </a:t>
-            </a:r>
-            <a:r>
-              <a:rPr sz="1800" spc="-10" dirty="0">
-                <a:solidFill>
-                  <a:srgbClr val="669668"/>
-                </a:solidFill>
-                <a:latin typeface="Courier New"/>
-                <a:cs typeface="Courier New"/>
-              </a:rPr>
-              <a:t>maior valor(R$) </a:t>
-            </a:r>
-            <a:r>
-              <a:rPr sz="1800" spc="-5" dirty="0">
-                <a:solidFill>
-                  <a:srgbClr val="669668"/>
-                </a:solidFill>
-                <a:latin typeface="Courier New"/>
-                <a:cs typeface="Courier New"/>
-              </a:rPr>
-              <a:t>em </a:t>
-            </a:r>
-            <a:r>
-              <a:rPr sz="1800" spc="-10" dirty="0">
-                <a:solidFill>
-                  <a:srgbClr val="669668"/>
-                </a:solidFill>
-                <a:latin typeface="Courier New"/>
-                <a:cs typeface="Courier New"/>
-              </a:rPr>
-              <a:t>vendas para </a:t>
-            </a:r>
-            <a:r>
-              <a:rPr sz="1800" spc="-1070" dirty="0">
-                <a:solidFill>
-                  <a:srgbClr val="669668"/>
-                </a:solidFill>
-                <a:latin typeface="Courier New"/>
-                <a:cs typeface="Courier New"/>
-              </a:rPr>
-              <a:t> </a:t>
-            </a:r>
-            <a:r>
-              <a:rPr sz="1800" dirty="0">
-                <a:solidFill>
-                  <a:srgbClr val="669668"/>
-                </a:solidFill>
-                <a:latin typeface="Courier New"/>
-                <a:cs typeface="Courier New"/>
-              </a:rPr>
-              <a:t>o</a:t>
-            </a:r>
-            <a:r>
-              <a:rPr sz="1800" spc="-10" dirty="0">
-                <a:solidFill>
-                  <a:srgbClr val="669668"/>
-                </a:solidFill>
-                <a:latin typeface="Courier New"/>
-                <a:cs typeface="Courier New"/>
-              </a:rPr>
-              <a:t> mês</a:t>
-            </a:r>
-            <a:r>
-              <a:rPr sz="1800" spc="-20" dirty="0">
-                <a:solidFill>
-                  <a:srgbClr val="669668"/>
-                </a:solidFill>
-                <a:latin typeface="Courier New"/>
-                <a:cs typeface="Courier New"/>
-              </a:rPr>
-              <a:t> </a:t>
-            </a:r>
-            <a:r>
-              <a:rPr sz="1800" spc="-10" dirty="0">
-                <a:solidFill>
-                  <a:srgbClr val="669668"/>
-                </a:solidFill>
-                <a:latin typeface="Courier New"/>
-                <a:cs typeface="Courier New"/>
-              </a:rPr>
-              <a:t>com</a:t>
-            </a:r>
-            <a:r>
-              <a:rPr sz="1800" spc="-20" dirty="0">
-                <a:solidFill>
-                  <a:srgbClr val="669668"/>
-                </a:solidFill>
-                <a:latin typeface="Courier New"/>
-                <a:cs typeface="Courier New"/>
-              </a:rPr>
-              <a:t> </a:t>
-            </a:r>
-            <a:r>
-              <a:rPr sz="1800" spc="-10" dirty="0">
-                <a:solidFill>
-                  <a:srgbClr val="669668"/>
-                </a:solidFill>
-                <a:latin typeface="Courier New"/>
-                <a:cs typeface="Courier New"/>
-              </a:rPr>
-              <a:t>menos</a:t>
-            </a:r>
-            <a:r>
-              <a:rPr sz="1800" spc="-15" dirty="0">
-                <a:solidFill>
-                  <a:srgbClr val="669668"/>
-                </a:solidFill>
-                <a:latin typeface="Courier New"/>
-                <a:cs typeface="Courier New"/>
-              </a:rPr>
-              <a:t> </a:t>
-            </a:r>
-            <a:r>
-              <a:rPr sz="1800" spc="-10" dirty="0">
-                <a:solidFill>
-                  <a:srgbClr val="669668"/>
-                </a:solidFill>
-                <a:latin typeface="Courier New"/>
-                <a:cs typeface="Courier New"/>
-              </a:rPr>
-              <a:t>vendas.</a:t>
             </a:r>
             <a:endParaRPr sz="1800">
               <a:latin typeface="Courier New"/>

</xml_diff>